<commit_message>
ReadMe added and Ppt Updated.
</commit_message>
<xml_diff>
--- a/Fun Stats.pptx
+++ b/Fun Stats.pptx
@@ -1,28 +1,28 @@
 
 <file path=ppt/presentation.xml><?xml version="1.0" encoding="utf-8"?>
-<p:presentation xmlns:a="http://schemas.openxmlformats.org/drawingml/2006/main" xmlns:r="http://schemas.openxmlformats.org/officeDocument/2006/relationships" xmlns:mc="http://schemas.openxmlformats.org/markup-compatibility/2006" xmlns:mv="urn:schemas-microsoft-com:mac:vml" xmlns:p="http://schemas.openxmlformats.org/presentationml/2006/main" xmlns:c="http://schemas.openxmlformats.org/drawingml/2006/chart" xmlns:dgm="http://schemas.openxmlformats.org/drawingml/2006/diagram" xmlns:o="urn:schemas-microsoft-com:office:office" xmlns:v="urn:schemas-microsoft-com:vml" xmlns:pvml="urn:schemas-microsoft-com:office:powerpoint" xmlns:com="http://schemas.openxmlformats.org/drawingml/2006/compatibility" xmlns:p14="http://schemas.microsoft.com/office/powerpoint/2010/main" autoCompressPictures="0" strictFirstAndLastChars="0" saveSubsetFonts="1">
+<p:presentation xmlns:a="http://schemas.openxmlformats.org/drawingml/2006/main" xmlns:r="http://schemas.openxmlformats.org/officeDocument/2006/relationships" xmlns:p="http://schemas.openxmlformats.org/presentationml/2006/main" strictFirstAndLastChars="0" saveSubsetFonts="1" autoCompressPictures="0">
   <p:sldMasterIdLst>
-    <p:sldMasterId id="2147483654" r:id="rId4"/>
+    <p:sldMasterId id="2147483654" r:id="rId1"/>
   </p:sldMasterIdLst>
   <p:notesMasterIdLst>
-    <p:notesMasterId r:id="rId5"/>
+    <p:notesMasterId r:id="rId12"/>
   </p:notesMasterIdLst>
   <p:sldIdLst>
-    <p:sldId id="256" r:id="rId6"/>
-    <p:sldId id="257" r:id="rId7"/>
-    <p:sldId id="258" r:id="rId8"/>
-    <p:sldId id="259" r:id="rId9"/>
-    <p:sldId id="260" r:id="rId10"/>
-    <p:sldId id="261" r:id="rId11"/>
-    <p:sldId id="262" r:id="rId12"/>
-    <p:sldId id="263" r:id="rId13"/>
-    <p:sldId id="264" r:id="rId14"/>
-    <p:sldId id="265" r:id="rId15"/>
+    <p:sldId id="256" r:id="rId2"/>
+    <p:sldId id="257" r:id="rId3"/>
+    <p:sldId id="258" r:id="rId4"/>
+    <p:sldId id="259" r:id="rId5"/>
+    <p:sldId id="260" r:id="rId6"/>
+    <p:sldId id="261" r:id="rId7"/>
+    <p:sldId id="262" r:id="rId8"/>
+    <p:sldId id="263" r:id="rId9"/>
+    <p:sldId id="264" r:id="rId10"/>
+    <p:sldId id="265" r:id="rId11"/>
   </p:sldIdLst>
-  <p:sldSz cy="5143500" cx="9144000"/>
+  <p:sldSz cx="9144000" cy="5143500" type="screen16x9"/>
   <p:notesSz cx="6858000" cy="9144000"/>
   <p:defaultTextStyle>
-    <a:defPPr marR="0" rtl="0" algn="l">
+    <a:defPPr marR="0" algn="l" rtl="0">
       <a:lnSpc>
         <a:spcPct val="100000"/>
       </a:lnSpc>
@@ -33,7 +33,7 @@
         <a:spcPts val="0"/>
       </a:spcAft>
     </a:defPPr>
-    <a:lvl1pPr marR="0" rtl="0" algn="l">
+    <a:lvl1pPr marR="0" algn="l" rtl="0">
       <a:lnSpc>
         <a:spcPct val="100000"/>
       </a:lnSpc>
@@ -44,7 +44,7 @@
         <a:spcPts val="0"/>
       </a:spcAft>
       <a:buNone/>
-      <a:defRPr b="0" baseline="0" i="0" sz="1400" u="none" cap="none" strike="noStrike">
+      <a:defRPr sz="1400" b="0" i="0" u="none" strike="noStrike" cap="none" baseline="0">
         <a:solidFill>
           <a:srgbClr val="000000"/>
         </a:solidFill>
@@ -55,7 +55,7 @@
         <a:rtl val="0"/>
       </a:defRPr>
     </a:lvl1pPr>
-    <a:lvl2pPr marR="0" rtl="0" algn="l">
+    <a:lvl2pPr marR="0" algn="l" rtl="0">
       <a:lnSpc>
         <a:spcPct val="100000"/>
       </a:lnSpc>
@@ -66,7 +66,7 @@
         <a:spcPts val="0"/>
       </a:spcAft>
       <a:buNone/>
-      <a:defRPr b="0" baseline="0" i="0" sz="1400" u="none" cap="none" strike="noStrike">
+      <a:defRPr sz="1400" b="0" i="0" u="none" strike="noStrike" cap="none" baseline="0">
         <a:solidFill>
           <a:srgbClr val="000000"/>
         </a:solidFill>
@@ -77,7 +77,7 @@
         <a:rtl val="0"/>
       </a:defRPr>
     </a:lvl2pPr>
-    <a:lvl3pPr marR="0" rtl="0" algn="l">
+    <a:lvl3pPr marR="0" algn="l" rtl="0">
       <a:lnSpc>
         <a:spcPct val="100000"/>
       </a:lnSpc>
@@ -88,7 +88,7 @@
         <a:spcPts val="0"/>
       </a:spcAft>
       <a:buNone/>
-      <a:defRPr b="0" baseline="0" i="0" sz="1400" u="none" cap="none" strike="noStrike">
+      <a:defRPr sz="1400" b="0" i="0" u="none" strike="noStrike" cap="none" baseline="0">
         <a:solidFill>
           <a:srgbClr val="000000"/>
         </a:solidFill>
@@ -99,7 +99,7 @@
         <a:rtl val="0"/>
       </a:defRPr>
     </a:lvl3pPr>
-    <a:lvl4pPr marR="0" rtl="0" algn="l">
+    <a:lvl4pPr marR="0" algn="l" rtl="0">
       <a:lnSpc>
         <a:spcPct val="100000"/>
       </a:lnSpc>
@@ -110,7 +110,7 @@
         <a:spcPts val="0"/>
       </a:spcAft>
       <a:buNone/>
-      <a:defRPr b="0" baseline="0" i="0" sz="1400" u="none" cap="none" strike="noStrike">
+      <a:defRPr sz="1400" b="0" i="0" u="none" strike="noStrike" cap="none" baseline="0">
         <a:solidFill>
           <a:srgbClr val="000000"/>
         </a:solidFill>
@@ -121,7 +121,7 @@
         <a:rtl val="0"/>
       </a:defRPr>
     </a:lvl4pPr>
-    <a:lvl5pPr marR="0" rtl="0" algn="l">
+    <a:lvl5pPr marR="0" algn="l" rtl="0">
       <a:lnSpc>
         <a:spcPct val="100000"/>
       </a:lnSpc>
@@ -132,7 +132,7 @@
         <a:spcPts val="0"/>
       </a:spcAft>
       <a:buNone/>
-      <a:defRPr b="0" baseline="0" i="0" sz="1400" u="none" cap="none" strike="noStrike">
+      <a:defRPr sz="1400" b="0" i="0" u="none" strike="noStrike" cap="none" baseline="0">
         <a:solidFill>
           <a:srgbClr val="000000"/>
         </a:solidFill>
@@ -143,7 +143,7 @@
         <a:rtl val="0"/>
       </a:defRPr>
     </a:lvl5pPr>
-    <a:lvl6pPr marR="0" rtl="0" algn="l">
+    <a:lvl6pPr marR="0" algn="l" rtl="0">
       <a:lnSpc>
         <a:spcPct val="100000"/>
       </a:lnSpc>
@@ -154,7 +154,7 @@
         <a:spcPts val="0"/>
       </a:spcAft>
       <a:buNone/>
-      <a:defRPr b="0" baseline="0" i="0" sz="1400" u="none" cap="none" strike="noStrike">
+      <a:defRPr sz="1400" b="0" i="0" u="none" strike="noStrike" cap="none" baseline="0">
         <a:solidFill>
           <a:srgbClr val="000000"/>
         </a:solidFill>
@@ -165,7 +165,7 @@
         <a:rtl val="0"/>
       </a:defRPr>
     </a:lvl6pPr>
-    <a:lvl7pPr marR="0" rtl="0" algn="l">
+    <a:lvl7pPr marR="0" algn="l" rtl="0">
       <a:lnSpc>
         <a:spcPct val="100000"/>
       </a:lnSpc>
@@ -176,7 +176,7 @@
         <a:spcPts val="0"/>
       </a:spcAft>
       <a:buNone/>
-      <a:defRPr b="0" baseline="0" i="0" sz="1400" u="none" cap="none" strike="noStrike">
+      <a:defRPr sz="1400" b="0" i="0" u="none" strike="noStrike" cap="none" baseline="0">
         <a:solidFill>
           <a:srgbClr val="000000"/>
         </a:solidFill>
@@ -187,7 +187,7 @@
         <a:rtl val="0"/>
       </a:defRPr>
     </a:lvl7pPr>
-    <a:lvl8pPr marR="0" rtl="0" algn="l">
+    <a:lvl8pPr marR="0" algn="l" rtl="0">
       <a:lnSpc>
         <a:spcPct val="100000"/>
       </a:lnSpc>
@@ -198,7 +198,7 @@
         <a:spcPts val="0"/>
       </a:spcAft>
       <a:buNone/>
-      <a:defRPr b="0" baseline="0" i="0" sz="1400" u="none" cap="none" strike="noStrike">
+      <a:defRPr sz="1400" b="0" i="0" u="none" strike="noStrike" cap="none" baseline="0">
         <a:solidFill>
           <a:srgbClr val="000000"/>
         </a:solidFill>
@@ -209,7 +209,7 @@
         <a:rtl val="0"/>
       </a:defRPr>
     </a:lvl8pPr>
-    <a:lvl9pPr marR="0" rtl="0" algn="l">
+    <a:lvl9pPr marR="0" algn="l" rtl="0">
       <a:lnSpc>
         <a:spcPct val="100000"/>
       </a:lnSpc>
@@ -220,7 +220,7 @@
         <a:spcPts val="0"/>
       </a:spcAft>
       <a:buNone/>
-      <a:defRPr b="0" baseline="0" i="0" sz="1400" u="none" cap="none" strike="noStrike">
+      <a:defRPr sz="1400" b="0" i="0" u="none" strike="noStrike" cap="none" baseline="0">
         <a:solidFill>
           <a:srgbClr val="000000"/>
         </a:solidFill>
@@ -236,8 +236,13 @@
 </file>
 
 <file path=ppt/notesMasters/notesMaster1.xml><?xml version="1.0" encoding="utf-8"?>
-<p:notesMaster xmlns:a="http://schemas.openxmlformats.org/drawingml/2006/main" xmlns:r="http://schemas.openxmlformats.org/officeDocument/2006/relationships" xmlns:mc="http://schemas.openxmlformats.org/markup-compatibility/2006" xmlns:mv="urn:schemas-microsoft-com:mac:vml" xmlns:p="http://schemas.openxmlformats.org/presentationml/2006/main" xmlns:c="http://schemas.openxmlformats.org/drawingml/2006/chart" xmlns:dgm="http://schemas.openxmlformats.org/drawingml/2006/diagram" xmlns:o="urn:schemas-microsoft-com:office:office" xmlns:v="urn:schemas-microsoft-com:vml" xmlns:pvml="urn:schemas-microsoft-com:office:powerpoint" xmlns:com="http://schemas.openxmlformats.org/drawingml/2006/compatibility" xmlns:p14="http://schemas.microsoft.com/office/powerpoint/2010/main">
+<p:notesMaster xmlns:a="http://schemas.openxmlformats.org/drawingml/2006/main" xmlns:r="http://schemas.openxmlformats.org/officeDocument/2006/relationships" xmlns:p="http://schemas.openxmlformats.org/presentationml/2006/main">
   <p:cSld>
+    <p:bg>
+      <p:bgRef idx="1001">
+        <a:schemeClr val="bg1"/>
+      </p:bgRef>
+    </p:bg>
     <p:spTree>
       <p:nvGrpSpPr>
         <p:cNvPr id="1" name="Shape 1"/>
@@ -255,9 +260,11 @@
       <p:sp>
         <p:nvSpPr>
           <p:cNvPr id="2" name="Shape 2"/>
-          <p:cNvSpPr/>
+          <p:cNvSpPr>
+            <a:spLocks noGrp="1" noRot="1" noChangeAspect="1"/>
+          </p:cNvSpPr>
           <p:nvPr>
-            <p:ph idx="2" type="sldImg"/>
+            <p:ph type="sldImg" idx="2"/>
           </p:nvPr>
         </p:nvSpPr>
         <p:spPr>
@@ -266,8 +273,13 @@
             <a:ext cx="6096299" cy="3429000"/>
           </a:xfrm>
           <a:custGeom>
+            <a:avLst/>
+            <a:gdLst/>
+            <a:ahLst/>
+            <a:cxnLst/>
+            <a:rect l="0" t="0" r="0" b="0"/>
             <a:pathLst>
-              <a:path extrusionOk="0" h="120000" w="120000">
+              <a:path w="120000" h="120000" extrusionOk="0">
                 <a:moveTo>
                   <a:pt x="0" y="0"/>
                 </a:moveTo>
@@ -285,23 +297,25 @@
             </a:pathLst>
           </a:custGeom>
           <a:noFill/>
-          <a:ln cap="flat" w="9525">
+          <a:ln w="9525" cap="flat">
             <a:solidFill>
               <a:srgbClr val="000000"/>
             </a:solidFill>
             <a:prstDash val="solid"/>
             <a:round/>
-            <a:headEnd len="med" w="med" type="none"/>
-            <a:tailEnd len="med" w="med" type="none"/>
+            <a:headEnd type="none" w="med" len="med"/>
+            <a:tailEnd type="none" w="med" len="med"/>
           </a:ln>
         </p:spPr>
       </p:sp>
       <p:sp>
         <p:nvSpPr>
           <p:cNvPr id="3" name="Shape 3"/>
-          <p:cNvSpPr txBox="1"/>
+          <p:cNvSpPr txBox="1">
+            <a:spLocks noGrp="1"/>
+          </p:cNvSpPr>
           <p:nvPr>
-            <p:ph idx="1" type="body"/>
+            <p:ph type="body" idx="1"/>
           </p:nvPr>
         </p:nvSpPr>
         <p:spPr>
@@ -318,7 +332,7 @@
           </a:ln>
         </p:spPr>
         <p:txBody>
-          <a:bodyPr anchorCtr="0" anchor="t" bIns="91425" lIns="91425" rIns="91425" tIns="91425"/>
+          <a:bodyPr lIns="91425" tIns="91425" rIns="91425" bIns="91425" anchor="t" anchorCtr="0"/>
           <a:lstStyle>
             <a:lvl1pPr>
               <a:spcBef>
@@ -375,21 +389,120 @@
               <a:defRPr sz="1100"/>
             </a:lvl9pPr>
           </a:lstStyle>
-          <a:p/>
+          <a:p>
+            <a:endParaRPr/>
+          </a:p>
         </p:txBody>
       </p:sp>
     </p:spTree>
+    <p:extLst>
+      <p:ext uri="{BB962C8B-B14F-4D97-AF65-F5344CB8AC3E}">
+        <p14:creationId xmlns:p14="http://schemas.microsoft.com/office/powerpoint/2010/main" val="965378823"/>
+      </p:ext>
+    </p:extLst>
   </p:cSld>
-  <p:clrMap accent1="accent1" accent2="accent2" accent3="accent3" accent4="accent4" accent5="accent5" accent6="accent6" bg1="lt1" bg2="dk2" tx1="dk1" tx2="lt2" folHlink="folHlink" hlink="hlink"/>
+  <p:clrMap bg1="lt1" tx1="dk1" bg2="dk2" tx2="lt2" accent1="accent1" accent2="accent2" accent3="accent3" accent4="accent4" accent5="accent5" accent6="accent6" hlink="hlink" folHlink="folHlink"/>
+  <p:notesStyle>
+    <a:lvl1pPr marL="0" algn="l" defTabSz="914400" rtl="0" eaLnBrk="1" latinLnBrk="0" hangingPunct="1">
+      <a:defRPr sz="1200" kern="1200">
+        <a:solidFill>
+          <a:schemeClr val="tx1"/>
+        </a:solidFill>
+        <a:latin typeface="+mn-lt"/>
+        <a:ea typeface="+mn-ea"/>
+        <a:cs typeface="+mn-cs"/>
+      </a:defRPr>
+    </a:lvl1pPr>
+    <a:lvl2pPr marL="457200" algn="l" defTabSz="914400" rtl="0" eaLnBrk="1" latinLnBrk="0" hangingPunct="1">
+      <a:defRPr sz="1200" kern="1200">
+        <a:solidFill>
+          <a:schemeClr val="tx1"/>
+        </a:solidFill>
+        <a:latin typeface="+mn-lt"/>
+        <a:ea typeface="+mn-ea"/>
+        <a:cs typeface="+mn-cs"/>
+      </a:defRPr>
+    </a:lvl2pPr>
+    <a:lvl3pPr marL="914400" algn="l" defTabSz="914400" rtl="0" eaLnBrk="1" latinLnBrk="0" hangingPunct="1">
+      <a:defRPr sz="1200" kern="1200">
+        <a:solidFill>
+          <a:schemeClr val="tx1"/>
+        </a:solidFill>
+        <a:latin typeface="+mn-lt"/>
+        <a:ea typeface="+mn-ea"/>
+        <a:cs typeface="+mn-cs"/>
+      </a:defRPr>
+    </a:lvl3pPr>
+    <a:lvl4pPr marL="1371600" algn="l" defTabSz="914400" rtl="0" eaLnBrk="1" latinLnBrk="0" hangingPunct="1">
+      <a:defRPr sz="1200" kern="1200">
+        <a:solidFill>
+          <a:schemeClr val="tx1"/>
+        </a:solidFill>
+        <a:latin typeface="+mn-lt"/>
+        <a:ea typeface="+mn-ea"/>
+        <a:cs typeface="+mn-cs"/>
+      </a:defRPr>
+    </a:lvl4pPr>
+    <a:lvl5pPr marL="1828800" algn="l" defTabSz="914400" rtl="0" eaLnBrk="1" latinLnBrk="0" hangingPunct="1">
+      <a:defRPr sz="1200" kern="1200">
+        <a:solidFill>
+          <a:schemeClr val="tx1"/>
+        </a:solidFill>
+        <a:latin typeface="+mn-lt"/>
+        <a:ea typeface="+mn-ea"/>
+        <a:cs typeface="+mn-cs"/>
+      </a:defRPr>
+    </a:lvl5pPr>
+    <a:lvl6pPr marL="2286000" algn="l" defTabSz="914400" rtl="0" eaLnBrk="1" latinLnBrk="0" hangingPunct="1">
+      <a:defRPr sz="1200" kern="1200">
+        <a:solidFill>
+          <a:schemeClr val="tx1"/>
+        </a:solidFill>
+        <a:latin typeface="+mn-lt"/>
+        <a:ea typeface="+mn-ea"/>
+        <a:cs typeface="+mn-cs"/>
+      </a:defRPr>
+    </a:lvl6pPr>
+    <a:lvl7pPr marL="2743200" algn="l" defTabSz="914400" rtl="0" eaLnBrk="1" latinLnBrk="0" hangingPunct="1">
+      <a:defRPr sz="1200" kern="1200">
+        <a:solidFill>
+          <a:schemeClr val="tx1"/>
+        </a:solidFill>
+        <a:latin typeface="+mn-lt"/>
+        <a:ea typeface="+mn-ea"/>
+        <a:cs typeface="+mn-cs"/>
+      </a:defRPr>
+    </a:lvl7pPr>
+    <a:lvl8pPr marL="3200400" algn="l" defTabSz="914400" rtl="0" eaLnBrk="1" latinLnBrk="0" hangingPunct="1">
+      <a:defRPr sz="1200" kern="1200">
+        <a:solidFill>
+          <a:schemeClr val="tx1"/>
+        </a:solidFill>
+        <a:latin typeface="+mn-lt"/>
+        <a:ea typeface="+mn-ea"/>
+        <a:cs typeface="+mn-cs"/>
+      </a:defRPr>
+    </a:lvl8pPr>
+    <a:lvl9pPr marL="3657600" algn="l" defTabSz="914400" rtl="0" eaLnBrk="1" latinLnBrk="0" hangingPunct="1">
+      <a:defRPr sz="1200" kern="1200">
+        <a:solidFill>
+          <a:schemeClr val="tx1"/>
+        </a:solidFill>
+        <a:latin typeface="+mn-lt"/>
+        <a:ea typeface="+mn-ea"/>
+        <a:cs typeface="+mn-cs"/>
+      </a:defRPr>
+    </a:lvl9pPr>
+  </p:notesStyle>
 </p:notesMaster>
 </file>
 
 <file path=ppt/notesSlides/notesSlide1.xml><?xml version="1.0" encoding="utf-8"?>
-<p:notes xmlns:a="http://schemas.openxmlformats.org/drawingml/2006/main" xmlns:r="http://schemas.openxmlformats.org/officeDocument/2006/relationships" xmlns:mc="http://schemas.openxmlformats.org/markup-compatibility/2006" xmlns:mv="urn:schemas-microsoft-com:mac:vml" xmlns:p="http://schemas.openxmlformats.org/presentationml/2006/main" xmlns:c="http://schemas.openxmlformats.org/drawingml/2006/chart" xmlns:dgm="http://schemas.openxmlformats.org/drawingml/2006/diagram" xmlns:o="urn:schemas-microsoft-com:office:office" xmlns:v="urn:schemas-microsoft-com:vml" xmlns:pvml="urn:schemas-microsoft-com:office:powerpoint" xmlns:com="http://schemas.openxmlformats.org/drawingml/2006/compatibility" xmlns:p14="http://schemas.microsoft.com/office/powerpoint/2010/main" showMasterPhAnim="0" showMasterSp="0">
+<p:notes xmlns:a="http://schemas.openxmlformats.org/drawingml/2006/main" xmlns:r="http://schemas.openxmlformats.org/officeDocument/2006/relationships" xmlns:p="http://schemas.openxmlformats.org/presentationml/2006/main" showMasterSp="0" showMasterPhAnim="0">
   <p:cSld>
     <p:spTree>
       <p:nvGrpSpPr>
-        <p:cNvPr id="32" name="Shape 32"/>
+        <p:cNvPr id="1" name="Shape 32"/>
         <p:cNvGrpSpPr/>
         <p:nvPr/>
       </p:nvGrpSpPr>
@@ -404,19 +517,26 @@
       <p:sp>
         <p:nvSpPr>
           <p:cNvPr id="33" name="Shape 33"/>
-          <p:cNvSpPr/>
+          <p:cNvSpPr>
+            <a:spLocks noGrp="1" noRot="1" noChangeAspect="1"/>
+          </p:cNvSpPr>
           <p:nvPr>
-            <p:ph idx="2" type="sldImg"/>
+            <p:ph type="sldImg" idx="2"/>
           </p:nvPr>
         </p:nvSpPr>
         <p:spPr>
           <a:xfrm>
-            <a:off x="381187" y="685800"/>
-            <a:ext cx="6096299" cy="3429000"/>
+            <a:off x="381000" y="685800"/>
+            <a:ext cx="6096000" cy="3429000"/>
           </a:xfrm>
           <a:custGeom>
+            <a:avLst/>
+            <a:gdLst/>
+            <a:ahLst/>
+            <a:cxnLst/>
+            <a:rect l="0" t="0" r="0" b="0"/>
             <a:pathLst>
-              <a:path extrusionOk="0" h="120000" w="120000">
+              <a:path w="120000" h="120000" extrusionOk="0">
                 <a:moveTo>
                   <a:pt x="0" y="0"/>
                 </a:moveTo>
@@ -434,23 +554,25 @@
             </a:pathLst>
           </a:custGeom>
           <a:noFill/>
-          <a:ln cap="flat" w="9525">
+          <a:ln w="9525" cap="flat">
             <a:solidFill>
               <a:srgbClr val="000000"/>
             </a:solidFill>
             <a:prstDash val="solid"/>
             <a:round/>
-            <a:headEnd len="med" w="med" type="none"/>
-            <a:tailEnd len="med" w="med" type="none"/>
+            <a:headEnd type="none" w="med" len="med"/>
+            <a:tailEnd type="none" w="med" len="med"/>
           </a:ln>
         </p:spPr>
       </p:sp>
       <p:sp>
         <p:nvSpPr>
           <p:cNvPr id="34" name="Shape 34"/>
-          <p:cNvSpPr txBox="1"/>
+          <p:cNvSpPr txBox="1">
+            <a:spLocks noGrp="1"/>
+          </p:cNvSpPr>
           <p:nvPr>
-            <p:ph idx="1" type="body"/>
+            <p:ph type="body" idx="1"/>
           </p:nvPr>
         </p:nvSpPr>
         <p:spPr>
@@ -463,7 +585,7 @@
           </a:prstGeom>
         </p:spPr>
         <p:txBody>
-          <a:bodyPr anchorCtr="0" anchor="t" bIns="91425" lIns="91425" rIns="91425" tIns="91425">
+          <a:bodyPr lIns="91425" tIns="91425" rIns="91425" bIns="91425" anchor="t" anchorCtr="0">
             <a:noAutofit/>
           </a:bodyPr>
           <a:lstStyle/>
@@ -474,14 +596,16 @@
               </a:spcBef>
               <a:buNone/>
             </a:pPr>
-            <a:r>
-              <a:t/>
-            </a:r>
             <a:endParaRPr/>
           </a:p>
         </p:txBody>
       </p:sp>
     </p:spTree>
+    <p:extLst>
+      <p:ext uri="{BB962C8B-B14F-4D97-AF65-F5344CB8AC3E}">
+        <p14:creationId xmlns:p14="http://schemas.microsoft.com/office/powerpoint/2010/main" val="3310014547"/>
+      </p:ext>
+    </p:extLst>
   </p:cSld>
   <p:clrMapOvr>
     <a:masterClrMapping/>
@@ -490,11 +614,11 @@
 </file>
 
 <file path=ppt/notesSlides/notesSlide10.xml><?xml version="1.0" encoding="utf-8"?>
-<p:notes xmlns:a="http://schemas.openxmlformats.org/drawingml/2006/main" xmlns:r="http://schemas.openxmlformats.org/officeDocument/2006/relationships" xmlns:mc="http://schemas.openxmlformats.org/markup-compatibility/2006" xmlns:mv="urn:schemas-microsoft-com:mac:vml" xmlns:p="http://schemas.openxmlformats.org/presentationml/2006/main" xmlns:c="http://schemas.openxmlformats.org/drawingml/2006/chart" xmlns:dgm="http://schemas.openxmlformats.org/drawingml/2006/diagram" xmlns:o="urn:schemas-microsoft-com:office:office" xmlns:v="urn:schemas-microsoft-com:vml" xmlns:pvml="urn:schemas-microsoft-com:office:powerpoint" xmlns:com="http://schemas.openxmlformats.org/drawingml/2006/compatibility" xmlns:p14="http://schemas.microsoft.com/office/powerpoint/2010/main" showMasterPhAnim="0" showMasterSp="0">
+<p:notes xmlns:a="http://schemas.openxmlformats.org/drawingml/2006/main" xmlns:r="http://schemas.openxmlformats.org/officeDocument/2006/relationships" xmlns:p="http://schemas.openxmlformats.org/presentationml/2006/main" showMasterSp="0" showMasterPhAnim="0">
   <p:cSld>
     <p:spTree>
       <p:nvGrpSpPr>
-        <p:cNvPr id="91" name="Shape 91"/>
+        <p:cNvPr id="1" name="Shape 91"/>
         <p:cNvGrpSpPr/>
         <p:nvPr/>
       </p:nvGrpSpPr>
@@ -509,19 +633,26 @@
       <p:sp>
         <p:nvSpPr>
           <p:cNvPr id="92" name="Shape 92"/>
-          <p:cNvSpPr/>
+          <p:cNvSpPr>
+            <a:spLocks noGrp="1" noRot="1" noChangeAspect="1"/>
+          </p:cNvSpPr>
           <p:nvPr>
-            <p:ph idx="2" type="sldImg"/>
+            <p:ph type="sldImg" idx="2"/>
           </p:nvPr>
         </p:nvSpPr>
         <p:spPr>
           <a:xfrm>
-            <a:off x="381187" y="685800"/>
-            <a:ext cx="6096299" cy="3429000"/>
+            <a:off x="381000" y="685800"/>
+            <a:ext cx="6096000" cy="3429000"/>
           </a:xfrm>
           <a:custGeom>
+            <a:avLst/>
+            <a:gdLst/>
+            <a:ahLst/>
+            <a:cxnLst/>
+            <a:rect l="0" t="0" r="0" b="0"/>
             <a:pathLst>
-              <a:path extrusionOk="0" h="120000" w="120000">
+              <a:path w="120000" h="120000" extrusionOk="0">
                 <a:moveTo>
                   <a:pt x="0" y="0"/>
                 </a:moveTo>
@@ -539,23 +670,25 @@
             </a:pathLst>
           </a:custGeom>
           <a:noFill/>
-          <a:ln cap="flat" w="9525">
+          <a:ln w="9525" cap="flat">
             <a:solidFill>
               <a:srgbClr val="000000"/>
             </a:solidFill>
             <a:prstDash val="solid"/>
             <a:round/>
-            <a:headEnd len="med" w="med" type="none"/>
-            <a:tailEnd len="med" w="med" type="none"/>
+            <a:headEnd type="none" w="med" len="med"/>
+            <a:tailEnd type="none" w="med" len="med"/>
           </a:ln>
         </p:spPr>
       </p:sp>
       <p:sp>
         <p:nvSpPr>
           <p:cNvPr id="93" name="Shape 93"/>
-          <p:cNvSpPr txBox="1"/>
+          <p:cNvSpPr txBox="1">
+            <a:spLocks noGrp="1"/>
+          </p:cNvSpPr>
           <p:nvPr>
-            <p:ph idx="1" type="body"/>
+            <p:ph type="body" idx="1"/>
           </p:nvPr>
         </p:nvSpPr>
         <p:spPr>
@@ -568,7 +701,7 @@
           </a:prstGeom>
         </p:spPr>
         <p:txBody>
-          <a:bodyPr anchorCtr="0" anchor="t" bIns="91425" lIns="91425" rIns="91425" tIns="91425">
+          <a:bodyPr lIns="91425" tIns="91425" rIns="91425" bIns="91425" anchor="t" anchorCtr="0">
             <a:noAutofit/>
           </a:bodyPr>
           <a:lstStyle/>
@@ -579,14 +712,16 @@
               </a:spcBef>
               <a:buNone/>
             </a:pPr>
-            <a:r>
-              <a:t/>
-            </a:r>
             <a:endParaRPr/>
           </a:p>
         </p:txBody>
       </p:sp>
     </p:spTree>
+    <p:extLst>
+      <p:ext uri="{BB962C8B-B14F-4D97-AF65-F5344CB8AC3E}">
+        <p14:creationId xmlns:p14="http://schemas.microsoft.com/office/powerpoint/2010/main" val="3103571417"/>
+      </p:ext>
+    </p:extLst>
   </p:cSld>
   <p:clrMapOvr>
     <a:masterClrMapping/>
@@ -595,11 +730,11 @@
 </file>
 
 <file path=ppt/notesSlides/notesSlide2.xml><?xml version="1.0" encoding="utf-8"?>
-<p:notes xmlns:a="http://schemas.openxmlformats.org/drawingml/2006/main" xmlns:r="http://schemas.openxmlformats.org/officeDocument/2006/relationships" xmlns:mc="http://schemas.openxmlformats.org/markup-compatibility/2006" xmlns:mv="urn:schemas-microsoft-com:mac:vml" xmlns:p="http://schemas.openxmlformats.org/presentationml/2006/main" xmlns:c="http://schemas.openxmlformats.org/drawingml/2006/chart" xmlns:dgm="http://schemas.openxmlformats.org/drawingml/2006/diagram" xmlns:o="urn:schemas-microsoft-com:office:office" xmlns:v="urn:schemas-microsoft-com:vml" xmlns:pvml="urn:schemas-microsoft-com:office:powerpoint" xmlns:com="http://schemas.openxmlformats.org/drawingml/2006/compatibility" xmlns:p14="http://schemas.microsoft.com/office/powerpoint/2010/main" showMasterPhAnim="0" showMasterSp="0">
+<p:notes xmlns:a="http://schemas.openxmlformats.org/drawingml/2006/main" xmlns:r="http://schemas.openxmlformats.org/officeDocument/2006/relationships" xmlns:p="http://schemas.openxmlformats.org/presentationml/2006/main" showMasterSp="0" showMasterPhAnim="0">
   <p:cSld>
     <p:spTree>
       <p:nvGrpSpPr>
-        <p:cNvPr id="38" name="Shape 38"/>
+        <p:cNvPr id="1" name="Shape 38"/>
         <p:cNvGrpSpPr/>
         <p:nvPr/>
       </p:nvGrpSpPr>
@@ -614,19 +749,26 @@
       <p:sp>
         <p:nvSpPr>
           <p:cNvPr id="39" name="Shape 39"/>
-          <p:cNvSpPr/>
+          <p:cNvSpPr>
+            <a:spLocks noGrp="1" noRot="1" noChangeAspect="1"/>
+          </p:cNvSpPr>
           <p:nvPr>
-            <p:ph idx="2" type="sldImg"/>
+            <p:ph type="sldImg" idx="2"/>
           </p:nvPr>
         </p:nvSpPr>
         <p:spPr>
           <a:xfrm>
-            <a:off x="381187" y="685800"/>
-            <a:ext cx="6096299" cy="3429000"/>
+            <a:off x="381000" y="685800"/>
+            <a:ext cx="6096000" cy="3429000"/>
           </a:xfrm>
           <a:custGeom>
+            <a:avLst/>
+            <a:gdLst/>
+            <a:ahLst/>
+            <a:cxnLst/>
+            <a:rect l="0" t="0" r="0" b="0"/>
             <a:pathLst>
-              <a:path extrusionOk="0" h="120000" w="120000">
+              <a:path w="120000" h="120000" extrusionOk="0">
                 <a:moveTo>
                   <a:pt x="0" y="0"/>
                 </a:moveTo>
@@ -644,23 +786,25 @@
             </a:pathLst>
           </a:custGeom>
           <a:noFill/>
-          <a:ln cap="flat" w="9525">
+          <a:ln w="9525" cap="flat">
             <a:solidFill>
               <a:srgbClr val="000000"/>
             </a:solidFill>
             <a:prstDash val="solid"/>
             <a:round/>
-            <a:headEnd len="med" w="med" type="none"/>
-            <a:tailEnd len="med" w="med" type="none"/>
+            <a:headEnd type="none" w="med" len="med"/>
+            <a:tailEnd type="none" w="med" len="med"/>
           </a:ln>
         </p:spPr>
       </p:sp>
       <p:sp>
         <p:nvSpPr>
           <p:cNvPr id="40" name="Shape 40"/>
-          <p:cNvSpPr txBox="1"/>
+          <p:cNvSpPr txBox="1">
+            <a:spLocks noGrp="1"/>
+          </p:cNvSpPr>
           <p:nvPr>
-            <p:ph idx="1" type="body"/>
+            <p:ph type="body" idx="1"/>
           </p:nvPr>
         </p:nvSpPr>
         <p:spPr>
@@ -673,7 +817,7 @@
           </a:prstGeom>
         </p:spPr>
         <p:txBody>
-          <a:bodyPr anchorCtr="0" anchor="t" bIns="91425" lIns="91425" rIns="91425" tIns="91425">
+          <a:bodyPr lIns="91425" tIns="91425" rIns="91425" bIns="91425" anchor="t" anchorCtr="0">
             <a:noAutofit/>
           </a:bodyPr>
           <a:lstStyle/>
@@ -684,14 +828,16 @@
               </a:spcBef>
               <a:buNone/>
             </a:pPr>
-            <a:r>
-              <a:t/>
-            </a:r>
             <a:endParaRPr/>
           </a:p>
         </p:txBody>
       </p:sp>
     </p:spTree>
+    <p:extLst>
+      <p:ext uri="{BB962C8B-B14F-4D97-AF65-F5344CB8AC3E}">
+        <p14:creationId xmlns:p14="http://schemas.microsoft.com/office/powerpoint/2010/main" val="706159789"/>
+      </p:ext>
+    </p:extLst>
   </p:cSld>
   <p:clrMapOvr>
     <a:masterClrMapping/>
@@ -700,11 +846,11 @@
 </file>
 
 <file path=ppt/notesSlides/notesSlide3.xml><?xml version="1.0" encoding="utf-8"?>
-<p:notes xmlns:a="http://schemas.openxmlformats.org/drawingml/2006/main" xmlns:r="http://schemas.openxmlformats.org/officeDocument/2006/relationships" xmlns:mc="http://schemas.openxmlformats.org/markup-compatibility/2006" xmlns:mv="urn:schemas-microsoft-com:mac:vml" xmlns:p="http://schemas.openxmlformats.org/presentationml/2006/main" xmlns:c="http://schemas.openxmlformats.org/drawingml/2006/chart" xmlns:dgm="http://schemas.openxmlformats.org/drawingml/2006/diagram" xmlns:o="urn:schemas-microsoft-com:office:office" xmlns:v="urn:schemas-microsoft-com:vml" xmlns:pvml="urn:schemas-microsoft-com:office:powerpoint" xmlns:com="http://schemas.openxmlformats.org/drawingml/2006/compatibility" xmlns:p14="http://schemas.microsoft.com/office/powerpoint/2010/main" showMasterPhAnim="0" showMasterSp="0">
+<p:notes xmlns:a="http://schemas.openxmlformats.org/drawingml/2006/main" xmlns:r="http://schemas.openxmlformats.org/officeDocument/2006/relationships" xmlns:p="http://schemas.openxmlformats.org/presentationml/2006/main" showMasterSp="0" showMasterPhAnim="0">
   <p:cSld>
     <p:spTree>
       <p:nvGrpSpPr>
-        <p:cNvPr id="44" name="Shape 44"/>
+        <p:cNvPr id="1" name="Shape 44"/>
         <p:cNvGrpSpPr/>
         <p:nvPr/>
       </p:nvGrpSpPr>
@@ -719,19 +865,26 @@
       <p:sp>
         <p:nvSpPr>
           <p:cNvPr id="45" name="Shape 45"/>
-          <p:cNvSpPr/>
+          <p:cNvSpPr>
+            <a:spLocks noGrp="1" noRot="1" noChangeAspect="1"/>
+          </p:cNvSpPr>
           <p:nvPr>
-            <p:ph idx="2" type="sldImg"/>
+            <p:ph type="sldImg" idx="2"/>
           </p:nvPr>
         </p:nvSpPr>
         <p:spPr>
           <a:xfrm>
-            <a:off x="381187" y="685800"/>
-            <a:ext cx="6096299" cy="3429000"/>
+            <a:off x="381000" y="685800"/>
+            <a:ext cx="6096000" cy="3429000"/>
           </a:xfrm>
           <a:custGeom>
+            <a:avLst/>
+            <a:gdLst/>
+            <a:ahLst/>
+            <a:cxnLst/>
+            <a:rect l="0" t="0" r="0" b="0"/>
             <a:pathLst>
-              <a:path extrusionOk="0" h="120000" w="120000">
+              <a:path w="120000" h="120000" extrusionOk="0">
                 <a:moveTo>
                   <a:pt x="0" y="0"/>
                 </a:moveTo>
@@ -749,23 +902,25 @@
             </a:pathLst>
           </a:custGeom>
           <a:noFill/>
-          <a:ln cap="flat" w="9525">
+          <a:ln w="9525" cap="flat">
             <a:solidFill>
               <a:srgbClr val="000000"/>
             </a:solidFill>
             <a:prstDash val="solid"/>
             <a:round/>
-            <a:headEnd len="med" w="med" type="none"/>
-            <a:tailEnd len="med" w="med" type="none"/>
+            <a:headEnd type="none" w="med" len="med"/>
+            <a:tailEnd type="none" w="med" len="med"/>
           </a:ln>
         </p:spPr>
       </p:sp>
       <p:sp>
         <p:nvSpPr>
           <p:cNvPr id="46" name="Shape 46"/>
-          <p:cNvSpPr txBox="1"/>
+          <p:cNvSpPr txBox="1">
+            <a:spLocks noGrp="1"/>
+          </p:cNvSpPr>
           <p:nvPr>
-            <p:ph idx="1" type="body"/>
+            <p:ph type="body" idx="1"/>
           </p:nvPr>
         </p:nvSpPr>
         <p:spPr>
@@ -778,7 +933,7 @@
           </a:prstGeom>
         </p:spPr>
         <p:txBody>
-          <a:bodyPr anchorCtr="0" anchor="t" bIns="91425" lIns="91425" rIns="91425" tIns="91425">
+          <a:bodyPr lIns="91425" tIns="91425" rIns="91425" bIns="91425" anchor="t" anchorCtr="0">
             <a:noAutofit/>
           </a:bodyPr>
           <a:lstStyle/>
@@ -789,14 +944,16 @@
               </a:spcBef>
               <a:buNone/>
             </a:pPr>
-            <a:r>
-              <a:t/>
-            </a:r>
             <a:endParaRPr/>
           </a:p>
         </p:txBody>
       </p:sp>
     </p:spTree>
+    <p:extLst>
+      <p:ext uri="{BB962C8B-B14F-4D97-AF65-F5344CB8AC3E}">
+        <p14:creationId xmlns:p14="http://schemas.microsoft.com/office/powerpoint/2010/main" val="2552775551"/>
+      </p:ext>
+    </p:extLst>
   </p:cSld>
   <p:clrMapOvr>
     <a:masterClrMapping/>
@@ -805,11 +962,11 @@
 </file>
 
 <file path=ppt/notesSlides/notesSlide4.xml><?xml version="1.0" encoding="utf-8"?>
-<p:notes xmlns:a="http://schemas.openxmlformats.org/drawingml/2006/main" xmlns:r="http://schemas.openxmlformats.org/officeDocument/2006/relationships" xmlns:mc="http://schemas.openxmlformats.org/markup-compatibility/2006" xmlns:mv="urn:schemas-microsoft-com:mac:vml" xmlns:p="http://schemas.openxmlformats.org/presentationml/2006/main" xmlns:c="http://schemas.openxmlformats.org/drawingml/2006/chart" xmlns:dgm="http://schemas.openxmlformats.org/drawingml/2006/diagram" xmlns:o="urn:schemas-microsoft-com:office:office" xmlns:v="urn:schemas-microsoft-com:vml" xmlns:pvml="urn:schemas-microsoft-com:office:powerpoint" xmlns:com="http://schemas.openxmlformats.org/drawingml/2006/compatibility" xmlns:p14="http://schemas.microsoft.com/office/powerpoint/2010/main" showMasterPhAnim="0" showMasterSp="0">
+<p:notes xmlns:a="http://schemas.openxmlformats.org/drawingml/2006/main" xmlns:r="http://schemas.openxmlformats.org/officeDocument/2006/relationships" xmlns:p="http://schemas.openxmlformats.org/presentationml/2006/main" showMasterSp="0" showMasterPhAnim="0">
   <p:cSld>
     <p:spTree>
       <p:nvGrpSpPr>
-        <p:cNvPr id="50" name="Shape 50"/>
+        <p:cNvPr id="1" name="Shape 50"/>
         <p:cNvGrpSpPr/>
         <p:nvPr/>
       </p:nvGrpSpPr>
@@ -824,19 +981,26 @@
       <p:sp>
         <p:nvSpPr>
           <p:cNvPr id="51" name="Shape 51"/>
-          <p:cNvSpPr/>
+          <p:cNvSpPr>
+            <a:spLocks noGrp="1" noRot="1" noChangeAspect="1"/>
+          </p:cNvSpPr>
           <p:nvPr>
-            <p:ph idx="2" type="sldImg"/>
+            <p:ph type="sldImg" idx="2"/>
           </p:nvPr>
         </p:nvSpPr>
         <p:spPr>
           <a:xfrm>
-            <a:off x="381187" y="685800"/>
-            <a:ext cx="6096299" cy="3429000"/>
+            <a:off x="381000" y="685800"/>
+            <a:ext cx="6096000" cy="3429000"/>
           </a:xfrm>
           <a:custGeom>
+            <a:avLst/>
+            <a:gdLst/>
+            <a:ahLst/>
+            <a:cxnLst/>
+            <a:rect l="0" t="0" r="0" b="0"/>
             <a:pathLst>
-              <a:path extrusionOk="0" h="120000" w="120000">
+              <a:path w="120000" h="120000" extrusionOk="0">
                 <a:moveTo>
                   <a:pt x="0" y="0"/>
                 </a:moveTo>
@@ -854,23 +1018,25 @@
             </a:pathLst>
           </a:custGeom>
           <a:noFill/>
-          <a:ln cap="flat" w="9525">
+          <a:ln w="9525" cap="flat">
             <a:solidFill>
               <a:srgbClr val="000000"/>
             </a:solidFill>
             <a:prstDash val="solid"/>
             <a:round/>
-            <a:headEnd len="med" w="med" type="none"/>
-            <a:tailEnd len="med" w="med" type="none"/>
+            <a:headEnd type="none" w="med" len="med"/>
+            <a:tailEnd type="none" w="med" len="med"/>
           </a:ln>
         </p:spPr>
       </p:sp>
       <p:sp>
         <p:nvSpPr>
           <p:cNvPr id="52" name="Shape 52"/>
-          <p:cNvSpPr txBox="1"/>
+          <p:cNvSpPr txBox="1">
+            <a:spLocks noGrp="1"/>
+          </p:cNvSpPr>
           <p:nvPr>
-            <p:ph idx="1" type="body"/>
+            <p:ph type="body" idx="1"/>
           </p:nvPr>
         </p:nvSpPr>
         <p:spPr>
@@ -883,7 +1049,7 @@
           </a:prstGeom>
         </p:spPr>
         <p:txBody>
-          <a:bodyPr anchorCtr="0" anchor="t" bIns="91425" lIns="91425" rIns="91425" tIns="91425">
+          <a:bodyPr lIns="91425" tIns="91425" rIns="91425" bIns="91425" anchor="t" anchorCtr="0">
             <a:noAutofit/>
           </a:bodyPr>
           <a:lstStyle/>
@@ -894,14 +1060,16 @@
               </a:spcBef>
               <a:buNone/>
             </a:pPr>
-            <a:r>
-              <a:t/>
-            </a:r>
             <a:endParaRPr/>
           </a:p>
         </p:txBody>
       </p:sp>
     </p:spTree>
+    <p:extLst>
+      <p:ext uri="{BB962C8B-B14F-4D97-AF65-F5344CB8AC3E}">
+        <p14:creationId xmlns:p14="http://schemas.microsoft.com/office/powerpoint/2010/main" val="2081278630"/>
+      </p:ext>
+    </p:extLst>
   </p:cSld>
   <p:clrMapOvr>
     <a:masterClrMapping/>
@@ -910,11 +1078,11 @@
 </file>
 
 <file path=ppt/notesSlides/notesSlide5.xml><?xml version="1.0" encoding="utf-8"?>
-<p:notes xmlns:a="http://schemas.openxmlformats.org/drawingml/2006/main" xmlns:r="http://schemas.openxmlformats.org/officeDocument/2006/relationships" xmlns:mc="http://schemas.openxmlformats.org/markup-compatibility/2006" xmlns:mv="urn:schemas-microsoft-com:mac:vml" xmlns:p="http://schemas.openxmlformats.org/presentationml/2006/main" xmlns:c="http://schemas.openxmlformats.org/drawingml/2006/chart" xmlns:dgm="http://schemas.openxmlformats.org/drawingml/2006/diagram" xmlns:o="urn:schemas-microsoft-com:office:office" xmlns:v="urn:schemas-microsoft-com:vml" xmlns:pvml="urn:schemas-microsoft-com:office:powerpoint" xmlns:com="http://schemas.openxmlformats.org/drawingml/2006/compatibility" xmlns:p14="http://schemas.microsoft.com/office/powerpoint/2010/main" showMasterPhAnim="0" showMasterSp="0">
+<p:notes xmlns:a="http://schemas.openxmlformats.org/drawingml/2006/main" xmlns:r="http://schemas.openxmlformats.org/officeDocument/2006/relationships" xmlns:p="http://schemas.openxmlformats.org/presentationml/2006/main" showMasterSp="0" showMasterPhAnim="0">
   <p:cSld>
     <p:spTree>
       <p:nvGrpSpPr>
-        <p:cNvPr id="56" name="Shape 56"/>
+        <p:cNvPr id="1" name="Shape 56"/>
         <p:cNvGrpSpPr/>
         <p:nvPr/>
       </p:nvGrpSpPr>
@@ -929,19 +1097,26 @@
       <p:sp>
         <p:nvSpPr>
           <p:cNvPr id="57" name="Shape 57"/>
-          <p:cNvSpPr/>
+          <p:cNvSpPr>
+            <a:spLocks noGrp="1" noRot="1" noChangeAspect="1"/>
+          </p:cNvSpPr>
           <p:nvPr>
-            <p:ph idx="2" type="sldImg"/>
+            <p:ph type="sldImg" idx="2"/>
           </p:nvPr>
         </p:nvSpPr>
         <p:spPr>
           <a:xfrm>
-            <a:off x="381187" y="685800"/>
-            <a:ext cx="6096299" cy="3429000"/>
+            <a:off x="381000" y="685800"/>
+            <a:ext cx="6096000" cy="3429000"/>
           </a:xfrm>
           <a:custGeom>
+            <a:avLst/>
+            <a:gdLst/>
+            <a:ahLst/>
+            <a:cxnLst/>
+            <a:rect l="0" t="0" r="0" b="0"/>
             <a:pathLst>
-              <a:path extrusionOk="0" h="120000" w="120000">
+              <a:path w="120000" h="120000" extrusionOk="0">
                 <a:moveTo>
                   <a:pt x="0" y="0"/>
                 </a:moveTo>
@@ -959,23 +1134,25 @@
             </a:pathLst>
           </a:custGeom>
           <a:noFill/>
-          <a:ln cap="flat" w="9525">
+          <a:ln w="9525" cap="flat">
             <a:solidFill>
               <a:srgbClr val="000000"/>
             </a:solidFill>
             <a:prstDash val="solid"/>
             <a:round/>
-            <a:headEnd len="med" w="med" type="none"/>
-            <a:tailEnd len="med" w="med" type="none"/>
+            <a:headEnd type="none" w="med" len="med"/>
+            <a:tailEnd type="none" w="med" len="med"/>
           </a:ln>
         </p:spPr>
       </p:sp>
       <p:sp>
         <p:nvSpPr>
           <p:cNvPr id="58" name="Shape 58"/>
-          <p:cNvSpPr txBox="1"/>
+          <p:cNvSpPr txBox="1">
+            <a:spLocks noGrp="1"/>
+          </p:cNvSpPr>
           <p:nvPr>
-            <p:ph idx="1" type="body"/>
+            <p:ph type="body" idx="1"/>
           </p:nvPr>
         </p:nvSpPr>
         <p:spPr>
@@ -988,7 +1165,7 @@
           </a:prstGeom>
         </p:spPr>
         <p:txBody>
-          <a:bodyPr anchorCtr="0" anchor="t" bIns="91425" lIns="91425" rIns="91425" tIns="91425">
+          <a:bodyPr lIns="91425" tIns="91425" rIns="91425" bIns="91425" anchor="t" anchorCtr="0">
             <a:noAutofit/>
           </a:bodyPr>
           <a:lstStyle/>
@@ -999,14 +1176,16 @@
               </a:spcBef>
               <a:buNone/>
             </a:pPr>
-            <a:r>
-              <a:t/>
-            </a:r>
             <a:endParaRPr/>
           </a:p>
         </p:txBody>
       </p:sp>
     </p:spTree>
+    <p:extLst>
+      <p:ext uri="{BB962C8B-B14F-4D97-AF65-F5344CB8AC3E}">
+        <p14:creationId xmlns:p14="http://schemas.microsoft.com/office/powerpoint/2010/main" val="2903410123"/>
+      </p:ext>
+    </p:extLst>
   </p:cSld>
   <p:clrMapOvr>
     <a:masterClrMapping/>
@@ -1015,11 +1194,11 @@
 </file>
 
 <file path=ppt/notesSlides/notesSlide6.xml><?xml version="1.0" encoding="utf-8"?>
-<p:notes xmlns:a="http://schemas.openxmlformats.org/drawingml/2006/main" xmlns:r="http://schemas.openxmlformats.org/officeDocument/2006/relationships" xmlns:mc="http://schemas.openxmlformats.org/markup-compatibility/2006" xmlns:mv="urn:schemas-microsoft-com:mac:vml" xmlns:p="http://schemas.openxmlformats.org/presentationml/2006/main" xmlns:c="http://schemas.openxmlformats.org/drawingml/2006/chart" xmlns:dgm="http://schemas.openxmlformats.org/drawingml/2006/diagram" xmlns:o="urn:schemas-microsoft-com:office:office" xmlns:v="urn:schemas-microsoft-com:vml" xmlns:pvml="urn:schemas-microsoft-com:office:powerpoint" xmlns:com="http://schemas.openxmlformats.org/drawingml/2006/compatibility" xmlns:p14="http://schemas.microsoft.com/office/powerpoint/2010/main" showMasterPhAnim="0" showMasterSp="0">
+<p:notes xmlns:a="http://schemas.openxmlformats.org/drawingml/2006/main" xmlns:r="http://schemas.openxmlformats.org/officeDocument/2006/relationships" xmlns:p="http://schemas.openxmlformats.org/presentationml/2006/main" showMasterSp="0" showMasterPhAnim="0">
   <p:cSld>
     <p:spTree>
       <p:nvGrpSpPr>
-        <p:cNvPr id="63" name="Shape 63"/>
+        <p:cNvPr id="1" name="Shape 63"/>
         <p:cNvGrpSpPr/>
         <p:nvPr/>
       </p:nvGrpSpPr>
@@ -1034,19 +1213,26 @@
       <p:sp>
         <p:nvSpPr>
           <p:cNvPr id="64" name="Shape 64"/>
-          <p:cNvSpPr/>
+          <p:cNvSpPr>
+            <a:spLocks noGrp="1" noRot="1" noChangeAspect="1"/>
+          </p:cNvSpPr>
           <p:nvPr>
-            <p:ph idx="2" type="sldImg"/>
+            <p:ph type="sldImg" idx="2"/>
           </p:nvPr>
         </p:nvSpPr>
         <p:spPr>
           <a:xfrm>
-            <a:off x="381187" y="685800"/>
-            <a:ext cx="6096299" cy="3429000"/>
+            <a:off x="381000" y="685800"/>
+            <a:ext cx="6096000" cy="3429000"/>
           </a:xfrm>
           <a:custGeom>
+            <a:avLst/>
+            <a:gdLst/>
+            <a:ahLst/>
+            <a:cxnLst/>
+            <a:rect l="0" t="0" r="0" b="0"/>
             <a:pathLst>
-              <a:path extrusionOk="0" h="120000" w="120000">
+              <a:path w="120000" h="120000" extrusionOk="0">
                 <a:moveTo>
                   <a:pt x="0" y="0"/>
                 </a:moveTo>
@@ -1064,23 +1250,25 @@
             </a:pathLst>
           </a:custGeom>
           <a:noFill/>
-          <a:ln cap="flat" w="9525">
+          <a:ln w="9525" cap="flat">
             <a:solidFill>
               <a:srgbClr val="000000"/>
             </a:solidFill>
             <a:prstDash val="solid"/>
             <a:round/>
-            <a:headEnd len="med" w="med" type="none"/>
-            <a:tailEnd len="med" w="med" type="none"/>
+            <a:headEnd type="none" w="med" len="med"/>
+            <a:tailEnd type="none" w="med" len="med"/>
           </a:ln>
         </p:spPr>
       </p:sp>
       <p:sp>
         <p:nvSpPr>
           <p:cNvPr id="65" name="Shape 65"/>
-          <p:cNvSpPr txBox="1"/>
+          <p:cNvSpPr txBox="1">
+            <a:spLocks noGrp="1"/>
+          </p:cNvSpPr>
           <p:nvPr>
-            <p:ph idx="1" type="body"/>
+            <p:ph type="body" idx="1"/>
           </p:nvPr>
         </p:nvSpPr>
         <p:spPr>
@@ -1093,7 +1281,7 @@
           </a:prstGeom>
         </p:spPr>
         <p:txBody>
-          <a:bodyPr anchorCtr="0" anchor="t" bIns="91425" lIns="91425" rIns="91425" tIns="91425">
+          <a:bodyPr lIns="91425" tIns="91425" rIns="91425" bIns="91425" anchor="t" anchorCtr="0">
             <a:noAutofit/>
           </a:bodyPr>
           <a:lstStyle/>
@@ -1104,14 +1292,16 @@
               </a:spcBef>
               <a:buNone/>
             </a:pPr>
-            <a:r>
-              <a:t/>
-            </a:r>
             <a:endParaRPr/>
           </a:p>
         </p:txBody>
       </p:sp>
     </p:spTree>
+    <p:extLst>
+      <p:ext uri="{BB962C8B-B14F-4D97-AF65-F5344CB8AC3E}">
+        <p14:creationId xmlns:p14="http://schemas.microsoft.com/office/powerpoint/2010/main" val="3134018592"/>
+      </p:ext>
+    </p:extLst>
   </p:cSld>
   <p:clrMapOvr>
     <a:masterClrMapping/>
@@ -1120,11 +1310,11 @@
 </file>
 
 <file path=ppt/notesSlides/notesSlide7.xml><?xml version="1.0" encoding="utf-8"?>
-<p:notes xmlns:a="http://schemas.openxmlformats.org/drawingml/2006/main" xmlns:r="http://schemas.openxmlformats.org/officeDocument/2006/relationships" xmlns:mc="http://schemas.openxmlformats.org/markup-compatibility/2006" xmlns:mv="urn:schemas-microsoft-com:mac:vml" xmlns:p="http://schemas.openxmlformats.org/presentationml/2006/main" xmlns:c="http://schemas.openxmlformats.org/drawingml/2006/chart" xmlns:dgm="http://schemas.openxmlformats.org/drawingml/2006/diagram" xmlns:o="urn:schemas-microsoft-com:office:office" xmlns:v="urn:schemas-microsoft-com:vml" xmlns:pvml="urn:schemas-microsoft-com:office:powerpoint" xmlns:com="http://schemas.openxmlformats.org/drawingml/2006/compatibility" xmlns:p14="http://schemas.microsoft.com/office/powerpoint/2010/main" showMasterPhAnim="0" showMasterSp="0">
+<p:notes xmlns:a="http://schemas.openxmlformats.org/drawingml/2006/main" xmlns:r="http://schemas.openxmlformats.org/officeDocument/2006/relationships" xmlns:p="http://schemas.openxmlformats.org/presentationml/2006/main" showMasterSp="0" showMasterPhAnim="0">
   <p:cSld>
     <p:spTree>
       <p:nvGrpSpPr>
-        <p:cNvPr id="70" name="Shape 70"/>
+        <p:cNvPr id="1" name="Shape 70"/>
         <p:cNvGrpSpPr/>
         <p:nvPr/>
       </p:nvGrpSpPr>
@@ -1139,19 +1329,26 @@
       <p:sp>
         <p:nvSpPr>
           <p:cNvPr id="71" name="Shape 71"/>
-          <p:cNvSpPr/>
+          <p:cNvSpPr>
+            <a:spLocks noGrp="1" noRot="1" noChangeAspect="1"/>
+          </p:cNvSpPr>
           <p:nvPr>
-            <p:ph idx="2" type="sldImg"/>
+            <p:ph type="sldImg" idx="2"/>
           </p:nvPr>
         </p:nvSpPr>
         <p:spPr>
           <a:xfrm>
-            <a:off x="381187" y="685800"/>
-            <a:ext cx="6096299" cy="3429000"/>
+            <a:off x="381000" y="685800"/>
+            <a:ext cx="6096000" cy="3429000"/>
           </a:xfrm>
           <a:custGeom>
+            <a:avLst/>
+            <a:gdLst/>
+            <a:ahLst/>
+            <a:cxnLst/>
+            <a:rect l="0" t="0" r="0" b="0"/>
             <a:pathLst>
-              <a:path extrusionOk="0" h="120000" w="120000">
+              <a:path w="120000" h="120000" extrusionOk="0">
                 <a:moveTo>
                   <a:pt x="0" y="0"/>
                 </a:moveTo>
@@ -1169,23 +1366,25 @@
             </a:pathLst>
           </a:custGeom>
           <a:noFill/>
-          <a:ln cap="flat" w="9525">
+          <a:ln w="9525" cap="flat">
             <a:solidFill>
               <a:srgbClr val="000000"/>
             </a:solidFill>
             <a:prstDash val="solid"/>
             <a:round/>
-            <a:headEnd len="med" w="med" type="none"/>
-            <a:tailEnd len="med" w="med" type="none"/>
+            <a:headEnd type="none" w="med" len="med"/>
+            <a:tailEnd type="none" w="med" len="med"/>
           </a:ln>
         </p:spPr>
       </p:sp>
       <p:sp>
         <p:nvSpPr>
           <p:cNvPr id="72" name="Shape 72"/>
-          <p:cNvSpPr txBox="1"/>
+          <p:cNvSpPr txBox="1">
+            <a:spLocks noGrp="1"/>
+          </p:cNvSpPr>
           <p:nvPr>
-            <p:ph idx="1" type="body"/>
+            <p:ph type="body" idx="1"/>
           </p:nvPr>
         </p:nvSpPr>
         <p:spPr>
@@ -1198,7 +1397,7 @@
           </a:prstGeom>
         </p:spPr>
         <p:txBody>
-          <a:bodyPr anchorCtr="0" anchor="t" bIns="91425" lIns="91425" rIns="91425" tIns="91425">
+          <a:bodyPr lIns="91425" tIns="91425" rIns="91425" bIns="91425" anchor="t" anchorCtr="0">
             <a:noAutofit/>
           </a:bodyPr>
           <a:lstStyle/>
@@ -1209,14 +1408,16 @@
               </a:spcBef>
               <a:buNone/>
             </a:pPr>
-            <a:r>
-              <a:t/>
-            </a:r>
             <a:endParaRPr/>
           </a:p>
         </p:txBody>
       </p:sp>
     </p:spTree>
+    <p:extLst>
+      <p:ext uri="{BB962C8B-B14F-4D97-AF65-F5344CB8AC3E}">
+        <p14:creationId xmlns:p14="http://schemas.microsoft.com/office/powerpoint/2010/main" val="3298128347"/>
+      </p:ext>
+    </p:extLst>
   </p:cSld>
   <p:clrMapOvr>
     <a:masterClrMapping/>
@@ -1225,11 +1426,11 @@
 </file>
 
 <file path=ppt/notesSlides/notesSlide8.xml><?xml version="1.0" encoding="utf-8"?>
-<p:notes xmlns:a="http://schemas.openxmlformats.org/drawingml/2006/main" xmlns:r="http://schemas.openxmlformats.org/officeDocument/2006/relationships" xmlns:mc="http://schemas.openxmlformats.org/markup-compatibility/2006" xmlns:mv="urn:schemas-microsoft-com:mac:vml" xmlns:p="http://schemas.openxmlformats.org/presentationml/2006/main" xmlns:c="http://schemas.openxmlformats.org/drawingml/2006/chart" xmlns:dgm="http://schemas.openxmlformats.org/drawingml/2006/diagram" xmlns:o="urn:schemas-microsoft-com:office:office" xmlns:v="urn:schemas-microsoft-com:vml" xmlns:pvml="urn:schemas-microsoft-com:office:powerpoint" xmlns:com="http://schemas.openxmlformats.org/drawingml/2006/compatibility" xmlns:p14="http://schemas.microsoft.com/office/powerpoint/2010/main" showMasterPhAnim="0" showMasterSp="0">
+<p:notes xmlns:a="http://schemas.openxmlformats.org/drawingml/2006/main" xmlns:r="http://schemas.openxmlformats.org/officeDocument/2006/relationships" xmlns:p="http://schemas.openxmlformats.org/presentationml/2006/main" showMasterSp="0" showMasterPhAnim="0">
   <p:cSld>
     <p:spTree>
       <p:nvGrpSpPr>
-        <p:cNvPr id="77" name="Shape 77"/>
+        <p:cNvPr id="1" name="Shape 77"/>
         <p:cNvGrpSpPr/>
         <p:nvPr/>
       </p:nvGrpSpPr>
@@ -1244,19 +1445,26 @@
       <p:sp>
         <p:nvSpPr>
           <p:cNvPr id="78" name="Shape 78"/>
-          <p:cNvSpPr/>
+          <p:cNvSpPr>
+            <a:spLocks noGrp="1" noRot="1" noChangeAspect="1"/>
+          </p:cNvSpPr>
           <p:nvPr>
-            <p:ph idx="2" type="sldImg"/>
+            <p:ph type="sldImg" idx="2"/>
           </p:nvPr>
         </p:nvSpPr>
         <p:spPr>
           <a:xfrm>
-            <a:off x="381187" y="685800"/>
-            <a:ext cx="6096299" cy="3429000"/>
+            <a:off x="381000" y="685800"/>
+            <a:ext cx="6096000" cy="3429000"/>
           </a:xfrm>
           <a:custGeom>
+            <a:avLst/>
+            <a:gdLst/>
+            <a:ahLst/>
+            <a:cxnLst/>
+            <a:rect l="0" t="0" r="0" b="0"/>
             <a:pathLst>
-              <a:path extrusionOk="0" h="120000" w="120000">
+              <a:path w="120000" h="120000" extrusionOk="0">
                 <a:moveTo>
                   <a:pt x="0" y="0"/>
                 </a:moveTo>
@@ -1274,23 +1482,25 @@
             </a:pathLst>
           </a:custGeom>
           <a:noFill/>
-          <a:ln cap="flat" w="9525">
+          <a:ln w="9525" cap="flat">
             <a:solidFill>
               <a:srgbClr val="000000"/>
             </a:solidFill>
             <a:prstDash val="solid"/>
             <a:round/>
-            <a:headEnd len="med" w="med" type="none"/>
-            <a:tailEnd len="med" w="med" type="none"/>
+            <a:headEnd type="none" w="med" len="med"/>
+            <a:tailEnd type="none" w="med" len="med"/>
           </a:ln>
         </p:spPr>
       </p:sp>
       <p:sp>
         <p:nvSpPr>
           <p:cNvPr id="79" name="Shape 79"/>
-          <p:cNvSpPr txBox="1"/>
+          <p:cNvSpPr txBox="1">
+            <a:spLocks noGrp="1"/>
+          </p:cNvSpPr>
           <p:nvPr>
-            <p:ph idx="1" type="body"/>
+            <p:ph type="body" idx="1"/>
           </p:nvPr>
         </p:nvSpPr>
         <p:spPr>
@@ -1303,7 +1513,7 @@
           </a:prstGeom>
         </p:spPr>
         <p:txBody>
-          <a:bodyPr anchorCtr="0" anchor="t" bIns="91425" lIns="91425" rIns="91425" tIns="91425">
+          <a:bodyPr lIns="91425" tIns="91425" rIns="91425" bIns="91425" anchor="t" anchorCtr="0">
             <a:noAutofit/>
           </a:bodyPr>
           <a:lstStyle/>
@@ -1314,14 +1524,16 @@
               </a:spcBef>
               <a:buNone/>
             </a:pPr>
-            <a:r>
-              <a:t/>
-            </a:r>
             <a:endParaRPr/>
           </a:p>
         </p:txBody>
       </p:sp>
     </p:spTree>
+    <p:extLst>
+      <p:ext uri="{BB962C8B-B14F-4D97-AF65-F5344CB8AC3E}">
+        <p14:creationId xmlns:p14="http://schemas.microsoft.com/office/powerpoint/2010/main" val="983024833"/>
+      </p:ext>
+    </p:extLst>
   </p:cSld>
   <p:clrMapOvr>
     <a:masterClrMapping/>
@@ -1330,11 +1542,11 @@
 </file>
 
 <file path=ppt/notesSlides/notesSlide9.xml><?xml version="1.0" encoding="utf-8"?>
-<p:notes xmlns:a="http://schemas.openxmlformats.org/drawingml/2006/main" xmlns:r="http://schemas.openxmlformats.org/officeDocument/2006/relationships" xmlns:mc="http://schemas.openxmlformats.org/markup-compatibility/2006" xmlns:mv="urn:schemas-microsoft-com:mac:vml" xmlns:p="http://schemas.openxmlformats.org/presentationml/2006/main" xmlns:c="http://schemas.openxmlformats.org/drawingml/2006/chart" xmlns:dgm="http://schemas.openxmlformats.org/drawingml/2006/diagram" xmlns:o="urn:schemas-microsoft-com:office:office" xmlns:v="urn:schemas-microsoft-com:vml" xmlns:pvml="urn:schemas-microsoft-com:office:powerpoint" xmlns:com="http://schemas.openxmlformats.org/drawingml/2006/compatibility" xmlns:p14="http://schemas.microsoft.com/office/powerpoint/2010/main" showMasterPhAnim="0" showMasterSp="0">
+<p:notes xmlns:a="http://schemas.openxmlformats.org/drawingml/2006/main" xmlns:r="http://schemas.openxmlformats.org/officeDocument/2006/relationships" xmlns:p="http://schemas.openxmlformats.org/presentationml/2006/main" showMasterSp="0" showMasterPhAnim="0">
   <p:cSld>
     <p:spTree>
       <p:nvGrpSpPr>
-        <p:cNvPr id="84" name="Shape 84"/>
+        <p:cNvPr id="1" name="Shape 84"/>
         <p:cNvGrpSpPr/>
         <p:nvPr/>
       </p:nvGrpSpPr>
@@ -1349,19 +1561,26 @@
       <p:sp>
         <p:nvSpPr>
           <p:cNvPr id="85" name="Shape 85"/>
-          <p:cNvSpPr/>
+          <p:cNvSpPr>
+            <a:spLocks noGrp="1" noRot="1" noChangeAspect="1"/>
+          </p:cNvSpPr>
           <p:nvPr>
-            <p:ph idx="2" type="sldImg"/>
+            <p:ph type="sldImg" idx="2"/>
           </p:nvPr>
         </p:nvSpPr>
         <p:spPr>
           <a:xfrm>
-            <a:off x="381187" y="685800"/>
-            <a:ext cx="6096299" cy="3429000"/>
+            <a:off x="381000" y="685800"/>
+            <a:ext cx="6096000" cy="3429000"/>
           </a:xfrm>
           <a:custGeom>
+            <a:avLst/>
+            <a:gdLst/>
+            <a:ahLst/>
+            <a:cxnLst/>
+            <a:rect l="0" t="0" r="0" b="0"/>
             <a:pathLst>
-              <a:path extrusionOk="0" h="120000" w="120000">
+              <a:path w="120000" h="120000" extrusionOk="0">
                 <a:moveTo>
                   <a:pt x="0" y="0"/>
                 </a:moveTo>
@@ -1379,23 +1598,25 @@
             </a:pathLst>
           </a:custGeom>
           <a:noFill/>
-          <a:ln cap="flat" w="9525">
+          <a:ln w="9525" cap="flat">
             <a:solidFill>
               <a:srgbClr val="000000"/>
             </a:solidFill>
             <a:prstDash val="solid"/>
             <a:round/>
-            <a:headEnd len="med" w="med" type="none"/>
-            <a:tailEnd len="med" w="med" type="none"/>
+            <a:headEnd type="none" w="med" len="med"/>
+            <a:tailEnd type="none" w="med" len="med"/>
           </a:ln>
         </p:spPr>
       </p:sp>
       <p:sp>
         <p:nvSpPr>
           <p:cNvPr id="86" name="Shape 86"/>
-          <p:cNvSpPr txBox="1"/>
+          <p:cNvSpPr txBox="1">
+            <a:spLocks noGrp="1"/>
+          </p:cNvSpPr>
           <p:nvPr>
-            <p:ph idx="1" type="body"/>
+            <p:ph type="body" idx="1"/>
           </p:nvPr>
         </p:nvSpPr>
         <p:spPr>
@@ -1408,7 +1629,7 @@
           </a:prstGeom>
         </p:spPr>
         <p:txBody>
-          <a:bodyPr anchorCtr="0" anchor="t" bIns="91425" lIns="91425" rIns="91425" tIns="91425">
+          <a:bodyPr lIns="91425" tIns="91425" rIns="91425" bIns="91425" anchor="t" anchorCtr="0">
             <a:noAutofit/>
           </a:bodyPr>
           <a:lstStyle/>
@@ -1419,14 +1640,16 @@
               </a:spcBef>
               <a:buNone/>
             </a:pPr>
-            <a:r>
-              <a:t/>
-            </a:r>
             <a:endParaRPr/>
           </a:p>
         </p:txBody>
       </p:sp>
     </p:spTree>
+    <p:extLst>
+      <p:ext uri="{BB962C8B-B14F-4D97-AF65-F5344CB8AC3E}">
+        <p14:creationId xmlns:p14="http://schemas.microsoft.com/office/powerpoint/2010/main" val="1520394443"/>
+      </p:ext>
+    </p:extLst>
   </p:cSld>
   <p:clrMapOvr>
     <a:masterClrMapping/>
@@ -1435,11 +1658,11 @@
 </file>
 
 <file path=ppt/slideLayouts/slideLayout1.xml><?xml version="1.0" encoding="utf-8"?>
-<p:sldLayout xmlns:a="http://schemas.openxmlformats.org/drawingml/2006/main" xmlns:r="http://schemas.openxmlformats.org/officeDocument/2006/relationships" xmlns:mc="http://schemas.openxmlformats.org/markup-compatibility/2006" xmlns:mv="urn:schemas-microsoft-com:mac:vml" xmlns:p="http://schemas.openxmlformats.org/presentationml/2006/main" xmlns:c="http://schemas.openxmlformats.org/drawingml/2006/chart" xmlns:dgm="http://schemas.openxmlformats.org/drawingml/2006/diagram" xmlns:o="urn:schemas-microsoft-com:office:office" xmlns:v="urn:schemas-microsoft-com:vml" xmlns:pvml="urn:schemas-microsoft-com:office:powerpoint" xmlns:com="http://schemas.openxmlformats.org/drawingml/2006/compatibility" xmlns:p14="http://schemas.microsoft.com/office/powerpoint/2010/main" type="title">
+<p:sldLayout xmlns:a="http://schemas.openxmlformats.org/drawingml/2006/main" xmlns:r="http://schemas.openxmlformats.org/officeDocument/2006/relationships" xmlns:p="http://schemas.openxmlformats.org/presentationml/2006/main" type="title">
   <p:cSld name="Title Slide">
     <p:spTree>
       <p:nvGrpSpPr>
-        <p:cNvPr id="8" name="Shape 8"/>
+        <p:cNvPr id="1" name="Shape 8"/>
         <p:cNvGrpSpPr/>
         <p:nvPr/>
       </p:nvGrpSpPr>
@@ -1454,7 +1677,9 @@
       <p:sp>
         <p:nvSpPr>
           <p:cNvPr id="9" name="Shape 9"/>
-          <p:cNvSpPr txBox="1"/>
+          <p:cNvSpPr txBox="1">
+            <a:spLocks noGrp="1"/>
+          </p:cNvSpPr>
           <p:nvPr>
             <p:ph type="ctrTitle"/>
           </p:nvPr>
@@ -1469,7 +1694,7 @@
           </a:prstGeom>
         </p:spPr>
         <p:txBody>
-          <a:bodyPr anchorCtr="0" anchor="b" bIns="91425" lIns="91425" rIns="91425" tIns="91425"/>
+          <a:bodyPr lIns="91425" tIns="91425" rIns="91425" bIns="91425" anchor="b" anchorCtr="0"/>
           <a:lstStyle>
             <a:lvl1pPr algn="ctr">
               <a:spcBef>
@@ -1535,15 +1760,19 @@
               <a:defRPr sz="4800"/>
             </a:lvl9pPr>
           </a:lstStyle>
-          <a:p/>
+          <a:p>
+            <a:endParaRPr/>
+          </a:p>
         </p:txBody>
       </p:sp>
       <p:sp>
         <p:nvSpPr>
           <p:cNvPr id="10" name="Shape 10"/>
-          <p:cNvSpPr txBox="1"/>
+          <p:cNvSpPr txBox="1">
+            <a:spLocks noGrp="1"/>
+          </p:cNvSpPr>
           <p:nvPr>
-            <p:ph idx="1" type="subTitle"/>
+            <p:ph type="subTitle" idx="1"/>
           </p:nvPr>
         </p:nvSpPr>
         <p:spPr>
@@ -1556,7 +1785,7 @@
           </a:prstGeom>
         </p:spPr>
         <p:txBody>
-          <a:bodyPr anchorCtr="0" anchor="t" bIns="91425" lIns="91425" rIns="91425" tIns="91425"/>
+          <a:bodyPr lIns="91425" tIns="91425" rIns="91425" bIns="91425" anchor="t" anchorCtr="0"/>
           <a:lstStyle>
             <a:lvl1pPr algn="ctr">
               <a:spcBef>
@@ -1693,15 +1922,19 @@
               </a:defRPr>
             </a:lvl9pPr>
           </a:lstStyle>
-          <a:p/>
+          <a:p>
+            <a:endParaRPr/>
+          </a:p>
         </p:txBody>
       </p:sp>
       <p:sp>
         <p:nvSpPr>
           <p:cNvPr id="11" name="Shape 11"/>
-          <p:cNvSpPr txBox="1"/>
+          <p:cNvSpPr txBox="1">
+            <a:spLocks noGrp="1"/>
+          </p:cNvSpPr>
           <p:nvPr>
-            <p:ph idx="12" type="sldNum"/>
+            <p:ph type="sldNum" idx="12"/>
           </p:nvPr>
         </p:nvSpPr>
         <p:spPr>
@@ -1714,7 +1947,7 @@
           </a:prstGeom>
         </p:spPr>
         <p:txBody>
-          <a:bodyPr anchorCtr="0" anchor="ctr" bIns="91425" lIns="91425" rIns="91425" tIns="91425">
+          <a:bodyPr lIns="91425" tIns="91425" rIns="91425" bIns="91425" anchor="ctr" anchorCtr="0">
             <a:noAutofit/>
           </a:bodyPr>
           <a:lstStyle>
@@ -1737,6 +1970,7 @@
               <a:rPr lang="en"/>
               <a:t>‹#›</a:t>
             </a:fld>
+            <a:endParaRPr lang="en"/>
           </a:p>
         </p:txBody>
       </p:sp>
@@ -1749,11 +1983,11 @@
 </file>
 
 <file path=ppt/slideLayouts/slideLayout2.xml><?xml version="1.0" encoding="utf-8"?>
-<p:sldLayout xmlns:a="http://schemas.openxmlformats.org/drawingml/2006/main" xmlns:r="http://schemas.openxmlformats.org/officeDocument/2006/relationships" xmlns:mc="http://schemas.openxmlformats.org/markup-compatibility/2006" xmlns:mv="urn:schemas-microsoft-com:mac:vml" xmlns:p="http://schemas.openxmlformats.org/presentationml/2006/main" xmlns:c="http://schemas.openxmlformats.org/drawingml/2006/chart" xmlns:dgm="http://schemas.openxmlformats.org/drawingml/2006/diagram" xmlns:o="urn:schemas-microsoft-com:office:office" xmlns:v="urn:schemas-microsoft-com:vml" xmlns:pvml="urn:schemas-microsoft-com:office:powerpoint" xmlns:com="http://schemas.openxmlformats.org/drawingml/2006/compatibility" xmlns:p14="http://schemas.microsoft.com/office/powerpoint/2010/main" type="tx">
+<p:sldLayout xmlns:a="http://schemas.openxmlformats.org/drawingml/2006/main" xmlns:r="http://schemas.openxmlformats.org/officeDocument/2006/relationships" xmlns:p="http://schemas.openxmlformats.org/presentationml/2006/main" type="tx">
   <p:cSld name="Title and Body">
     <p:spTree>
       <p:nvGrpSpPr>
-        <p:cNvPr id="12" name="Shape 12"/>
+        <p:cNvPr id="1" name="Shape 12"/>
         <p:cNvGrpSpPr/>
         <p:nvPr/>
       </p:nvGrpSpPr>
@@ -1768,7 +2002,9 @@
       <p:sp>
         <p:nvSpPr>
           <p:cNvPr id="13" name="Shape 13"/>
-          <p:cNvSpPr txBox="1"/>
+          <p:cNvSpPr txBox="1">
+            <a:spLocks noGrp="1"/>
+          </p:cNvSpPr>
           <p:nvPr>
             <p:ph type="title"/>
           </p:nvPr>
@@ -1783,7 +2019,7 @@
           </a:prstGeom>
         </p:spPr>
         <p:txBody>
-          <a:bodyPr anchorCtr="0" anchor="b" bIns="91425" lIns="91425" rIns="91425" tIns="91425"/>
+          <a:bodyPr lIns="91425" tIns="91425" rIns="91425" bIns="91425" anchor="b" anchorCtr="0"/>
           <a:lstStyle>
             <a:lvl1pPr>
               <a:spcBef>
@@ -1840,15 +2076,19 @@
               <a:defRPr/>
             </a:lvl9pPr>
           </a:lstStyle>
-          <a:p/>
+          <a:p>
+            <a:endParaRPr/>
+          </a:p>
         </p:txBody>
       </p:sp>
       <p:sp>
         <p:nvSpPr>
           <p:cNvPr id="14" name="Shape 14"/>
-          <p:cNvSpPr txBox="1"/>
+          <p:cNvSpPr txBox="1">
+            <a:spLocks noGrp="1"/>
+          </p:cNvSpPr>
           <p:nvPr>
-            <p:ph idx="1" type="body"/>
+            <p:ph type="body" idx="1"/>
           </p:nvPr>
         </p:nvSpPr>
         <p:spPr>
@@ -1861,7 +2101,7 @@
           </a:prstGeom>
         </p:spPr>
         <p:txBody>
-          <a:bodyPr anchorCtr="0" anchor="t" bIns="91425" lIns="91425" rIns="91425" tIns="91425"/>
+          <a:bodyPr lIns="91425" tIns="91425" rIns="91425" bIns="91425" anchor="t" anchorCtr="0"/>
           <a:lstStyle>
             <a:lvl1pPr>
               <a:spcBef>
@@ -1918,15 +2158,19 @@
               <a:defRPr/>
             </a:lvl9pPr>
           </a:lstStyle>
-          <a:p/>
+          <a:p>
+            <a:endParaRPr/>
+          </a:p>
         </p:txBody>
       </p:sp>
       <p:sp>
         <p:nvSpPr>
           <p:cNvPr id="15" name="Shape 15"/>
-          <p:cNvSpPr txBox="1"/>
+          <p:cNvSpPr txBox="1">
+            <a:spLocks noGrp="1"/>
+          </p:cNvSpPr>
           <p:nvPr>
-            <p:ph idx="12" type="sldNum"/>
+            <p:ph type="sldNum" idx="12"/>
           </p:nvPr>
         </p:nvSpPr>
         <p:spPr>
@@ -1939,7 +2183,7 @@
           </a:prstGeom>
         </p:spPr>
         <p:txBody>
-          <a:bodyPr anchorCtr="0" anchor="ctr" bIns="91425" lIns="91425" rIns="91425" tIns="91425">
+          <a:bodyPr lIns="91425" tIns="91425" rIns="91425" bIns="91425" anchor="ctr" anchorCtr="0">
             <a:noAutofit/>
           </a:bodyPr>
           <a:lstStyle>
@@ -1962,6 +2206,7 @@
               <a:rPr lang="en"/>
               <a:t>‹#›</a:t>
             </a:fld>
+            <a:endParaRPr lang="en"/>
           </a:p>
         </p:txBody>
       </p:sp>
@@ -1974,11 +2219,11 @@
 </file>
 
 <file path=ppt/slideLayouts/slideLayout3.xml><?xml version="1.0" encoding="utf-8"?>
-<p:sldLayout xmlns:a="http://schemas.openxmlformats.org/drawingml/2006/main" xmlns:r="http://schemas.openxmlformats.org/officeDocument/2006/relationships" xmlns:mc="http://schemas.openxmlformats.org/markup-compatibility/2006" xmlns:mv="urn:schemas-microsoft-com:mac:vml" xmlns:p="http://schemas.openxmlformats.org/presentationml/2006/main" xmlns:c="http://schemas.openxmlformats.org/drawingml/2006/chart" xmlns:dgm="http://schemas.openxmlformats.org/drawingml/2006/diagram" xmlns:o="urn:schemas-microsoft-com:office:office" xmlns:v="urn:schemas-microsoft-com:vml" xmlns:pvml="urn:schemas-microsoft-com:office:powerpoint" xmlns:com="http://schemas.openxmlformats.org/drawingml/2006/compatibility" xmlns:p14="http://schemas.microsoft.com/office/powerpoint/2010/main" type="twoColTx">
+<p:sldLayout xmlns:a="http://schemas.openxmlformats.org/drawingml/2006/main" xmlns:r="http://schemas.openxmlformats.org/officeDocument/2006/relationships" xmlns:p="http://schemas.openxmlformats.org/presentationml/2006/main" type="twoColTx">
   <p:cSld name="Title and Two Columns">
     <p:spTree>
       <p:nvGrpSpPr>
-        <p:cNvPr id="16" name="Shape 16"/>
+        <p:cNvPr id="1" name="Shape 16"/>
         <p:cNvGrpSpPr/>
         <p:nvPr/>
       </p:nvGrpSpPr>
@@ -1993,7 +2238,9 @@
       <p:sp>
         <p:nvSpPr>
           <p:cNvPr id="17" name="Shape 17"/>
-          <p:cNvSpPr txBox="1"/>
+          <p:cNvSpPr txBox="1">
+            <a:spLocks noGrp="1"/>
+          </p:cNvSpPr>
           <p:nvPr>
             <p:ph type="title"/>
           </p:nvPr>
@@ -2008,7 +2255,7 @@
           </a:prstGeom>
         </p:spPr>
         <p:txBody>
-          <a:bodyPr anchorCtr="0" anchor="b" bIns="91425" lIns="91425" rIns="91425" tIns="91425"/>
+          <a:bodyPr lIns="91425" tIns="91425" rIns="91425" bIns="91425" anchor="b" anchorCtr="0"/>
           <a:lstStyle>
             <a:lvl1pPr>
               <a:spcBef>
@@ -2065,15 +2312,19 @@
               <a:defRPr/>
             </a:lvl9pPr>
           </a:lstStyle>
-          <a:p/>
+          <a:p>
+            <a:endParaRPr/>
+          </a:p>
         </p:txBody>
       </p:sp>
       <p:sp>
         <p:nvSpPr>
           <p:cNvPr id="18" name="Shape 18"/>
-          <p:cNvSpPr txBox="1"/>
+          <p:cNvSpPr txBox="1">
+            <a:spLocks noGrp="1"/>
+          </p:cNvSpPr>
           <p:nvPr>
-            <p:ph idx="1" type="body"/>
+            <p:ph type="body" idx="1"/>
           </p:nvPr>
         </p:nvSpPr>
         <p:spPr>
@@ -2086,7 +2337,7 @@
           </a:prstGeom>
         </p:spPr>
         <p:txBody>
-          <a:bodyPr anchorCtr="0" anchor="t" bIns="91425" lIns="91425" rIns="91425" tIns="91425"/>
+          <a:bodyPr lIns="91425" tIns="91425" rIns="91425" bIns="91425" anchor="t" anchorCtr="0"/>
           <a:lstStyle>
             <a:lvl1pPr>
               <a:spcBef>
@@ -2143,15 +2394,19 @@
               <a:defRPr/>
             </a:lvl9pPr>
           </a:lstStyle>
-          <a:p/>
+          <a:p>
+            <a:endParaRPr/>
+          </a:p>
         </p:txBody>
       </p:sp>
       <p:sp>
         <p:nvSpPr>
           <p:cNvPr id="19" name="Shape 19"/>
-          <p:cNvSpPr txBox="1"/>
+          <p:cNvSpPr txBox="1">
+            <a:spLocks noGrp="1"/>
+          </p:cNvSpPr>
           <p:nvPr>
-            <p:ph idx="2" type="body"/>
+            <p:ph type="body" idx="2"/>
           </p:nvPr>
         </p:nvSpPr>
         <p:spPr>
@@ -2164,7 +2419,7 @@
           </a:prstGeom>
         </p:spPr>
         <p:txBody>
-          <a:bodyPr anchorCtr="0" anchor="t" bIns="91425" lIns="91425" rIns="91425" tIns="91425"/>
+          <a:bodyPr lIns="91425" tIns="91425" rIns="91425" bIns="91425" anchor="t" anchorCtr="0"/>
           <a:lstStyle>
             <a:lvl1pPr>
               <a:spcBef>
@@ -2221,15 +2476,19 @@
               <a:defRPr/>
             </a:lvl9pPr>
           </a:lstStyle>
-          <a:p/>
+          <a:p>
+            <a:endParaRPr/>
+          </a:p>
         </p:txBody>
       </p:sp>
       <p:sp>
         <p:nvSpPr>
           <p:cNvPr id="20" name="Shape 20"/>
-          <p:cNvSpPr txBox="1"/>
+          <p:cNvSpPr txBox="1">
+            <a:spLocks noGrp="1"/>
+          </p:cNvSpPr>
           <p:nvPr>
-            <p:ph idx="12" type="sldNum"/>
+            <p:ph type="sldNum" idx="12"/>
           </p:nvPr>
         </p:nvSpPr>
         <p:spPr>
@@ -2242,7 +2501,7 @@
           </a:prstGeom>
         </p:spPr>
         <p:txBody>
-          <a:bodyPr anchorCtr="0" anchor="ctr" bIns="91425" lIns="91425" rIns="91425" tIns="91425">
+          <a:bodyPr lIns="91425" tIns="91425" rIns="91425" bIns="91425" anchor="ctr" anchorCtr="0">
             <a:noAutofit/>
           </a:bodyPr>
           <a:lstStyle>
@@ -2265,6 +2524,7 @@
               <a:rPr lang="en"/>
               <a:t>‹#›</a:t>
             </a:fld>
+            <a:endParaRPr lang="en"/>
           </a:p>
         </p:txBody>
       </p:sp>
@@ -2277,11 +2537,11 @@
 </file>
 
 <file path=ppt/slideLayouts/slideLayout4.xml><?xml version="1.0" encoding="utf-8"?>
-<p:sldLayout xmlns:a="http://schemas.openxmlformats.org/drawingml/2006/main" xmlns:r="http://schemas.openxmlformats.org/officeDocument/2006/relationships" xmlns:mc="http://schemas.openxmlformats.org/markup-compatibility/2006" xmlns:mv="urn:schemas-microsoft-com:mac:vml" xmlns:p="http://schemas.openxmlformats.org/presentationml/2006/main" xmlns:c="http://schemas.openxmlformats.org/drawingml/2006/chart" xmlns:dgm="http://schemas.openxmlformats.org/drawingml/2006/diagram" xmlns:o="urn:schemas-microsoft-com:office:office" xmlns:v="urn:schemas-microsoft-com:vml" xmlns:pvml="urn:schemas-microsoft-com:office:powerpoint" xmlns:com="http://schemas.openxmlformats.org/drawingml/2006/compatibility" xmlns:p14="http://schemas.microsoft.com/office/powerpoint/2010/main" type="titleOnly">
+<p:sldLayout xmlns:a="http://schemas.openxmlformats.org/drawingml/2006/main" xmlns:r="http://schemas.openxmlformats.org/officeDocument/2006/relationships" xmlns:p="http://schemas.openxmlformats.org/presentationml/2006/main" type="titleOnly">
   <p:cSld name="Title Only">
     <p:spTree>
       <p:nvGrpSpPr>
-        <p:cNvPr id="21" name="Shape 21"/>
+        <p:cNvPr id="1" name="Shape 21"/>
         <p:cNvGrpSpPr/>
         <p:nvPr/>
       </p:nvGrpSpPr>
@@ -2296,7 +2556,9 @@
       <p:sp>
         <p:nvSpPr>
           <p:cNvPr id="22" name="Shape 22"/>
-          <p:cNvSpPr txBox="1"/>
+          <p:cNvSpPr txBox="1">
+            <a:spLocks noGrp="1"/>
+          </p:cNvSpPr>
           <p:nvPr>
             <p:ph type="title"/>
           </p:nvPr>
@@ -2311,7 +2573,7 @@
           </a:prstGeom>
         </p:spPr>
         <p:txBody>
-          <a:bodyPr anchorCtr="0" anchor="b" bIns="91425" lIns="91425" rIns="91425" tIns="91425"/>
+          <a:bodyPr lIns="91425" tIns="91425" rIns="91425" bIns="91425" anchor="b" anchorCtr="0"/>
           <a:lstStyle>
             <a:lvl1pPr>
               <a:spcBef>
@@ -2368,15 +2630,19 @@
               <a:defRPr/>
             </a:lvl9pPr>
           </a:lstStyle>
-          <a:p/>
+          <a:p>
+            <a:endParaRPr/>
+          </a:p>
         </p:txBody>
       </p:sp>
       <p:sp>
         <p:nvSpPr>
           <p:cNvPr id="23" name="Shape 23"/>
-          <p:cNvSpPr txBox="1"/>
+          <p:cNvSpPr txBox="1">
+            <a:spLocks noGrp="1"/>
+          </p:cNvSpPr>
           <p:nvPr>
-            <p:ph idx="12" type="sldNum"/>
+            <p:ph type="sldNum" idx="12"/>
           </p:nvPr>
         </p:nvSpPr>
         <p:spPr>
@@ -2389,7 +2655,7 @@
           </a:prstGeom>
         </p:spPr>
         <p:txBody>
-          <a:bodyPr anchorCtr="0" anchor="ctr" bIns="91425" lIns="91425" rIns="91425" tIns="91425">
+          <a:bodyPr lIns="91425" tIns="91425" rIns="91425" bIns="91425" anchor="ctr" anchorCtr="0">
             <a:noAutofit/>
           </a:bodyPr>
           <a:lstStyle>
@@ -2412,6 +2678,7 @@
               <a:rPr lang="en"/>
               <a:t>‹#›</a:t>
             </a:fld>
+            <a:endParaRPr lang="en"/>
           </a:p>
         </p:txBody>
       </p:sp>
@@ -2424,11 +2691,11 @@
 </file>
 
 <file path=ppt/slideLayouts/slideLayout5.xml><?xml version="1.0" encoding="utf-8"?>
-<p:sldLayout xmlns:a="http://schemas.openxmlformats.org/drawingml/2006/main" xmlns:r="http://schemas.openxmlformats.org/officeDocument/2006/relationships" xmlns:mc="http://schemas.openxmlformats.org/markup-compatibility/2006" xmlns:mv="urn:schemas-microsoft-com:mac:vml" xmlns:p="http://schemas.openxmlformats.org/presentationml/2006/main" xmlns:c="http://schemas.openxmlformats.org/drawingml/2006/chart" xmlns:dgm="http://schemas.openxmlformats.org/drawingml/2006/diagram" xmlns:o="urn:schemas-microsoft-com:office:office" xmlns:v="urn:schemas-microsoft-com:vml" xmlns:pvml="urn:schemas-microsoft-com:office:powerpoint" xmlns:com="http://schemas.openxmlformats.org/drawingml/2006/compatibility" xmlns:p14="http://schemas.microsoft.com/office/powerpoint/2010/main">
+<p:sldLayout xmlns:a="http://schemas.openxmlformats.org/drawingml/2006/main" xmlns:r="http://schemas.openxmlformats.org/officeDocument/2006/relationships" xmlns:p="http://schemas.openxmlformats.org/presentationml/2006/main">
   <p:cSld name="Caption">
     <p:spTree>
       <p:nvGrpSpPr>
-        <p:cNvPr id="24" name="Shape 24"/>
+        <p:cNvPr id="1" name="Shape 24"/>
         <p:cNvGrpSpPr/>
         <p:nvPr/>
       </p:nvGrpSpPr>
@@ -2443,9 +2710,11 @@
       <p:sp>
         <p:nvSpPr>
           <p:cNvPr id="25" name="Shape 25"/>
-          <p:cNvSpPr txBox="1"/>
+          <p:cNvSpPr txBox="1">
+            <a:spLocks noGrp="1"/>
+          </p:cNvSpPr>
           <p:nvPr>
-            <p:ph idx="1" type="body"/>
+            <p:ph type="body" idx="1"/>
           </p:nvPr>
         </p:nvSpPr>
         <p:spPr>
@@ -2458,7 +2727,7 @@
           </a:prstGeom>
         </p:spPr>
         <p:txBody>
-          <a:bodyPr anchorCtr="0" anchor="t" bIns="91425" lIns="91425" rIns="91425" tIns="91425"/>
+          <a:bodyPr lIns="91425" tIns="91425" rIns="91425" bIns="91425" anchor="t" anchorCtr="0"/>
           <a:lstStyle>
             <a:lvl1pPr algn="ctr">
               <a:spcBef>
@@ -2469,15 +2738,19 @@
               <a:defRPr sz="1800"/>
             </a:lvl1pPr>
           </a:lstStyle>
-          <a:p/>
+          <a:p>
+            <a:endParaRPr/>
+          </a:p>
         </p:txBody>
       </p:sp>
       <p:sp>
         <p:nvSpPr>
           <p:cNvPr id="26" name="Shape 26"/>
-          <p:cNvSpPr txBox="1"/>
+          <p:cNvSpPr txBox="1">
+            <a:spLocks noGrp="1"/>
+          </p:cNvSpPr>
           <p:nvPr>
-            <p:ph idx="12" type="sldNum"/>
+            <p:ph type="sldNum" idx="12"/>
           </p:nvPr>
         </p:nvSpPr>
         <p:spPr>
@@ -2490,7 +2763,7 @@
           </a:prstGeom>
         </p:spPr>
         <p:txBody>
-          <a:bodyPr anchorCtr="0" anchor="ctr" bIns="91425" lIns="91425" rIns="91425" tIns="91425">
+          <a:bodyPr lIns="91425" tIns="91425" rIns="91425" bIns="91425" anchor="ctr" anchorCtr="0">
             <a:noAutofit/>
           </a:bodyPr>
           <a:lstStyle>
@@ -2513,6 +2786,7 @@
               <a:rPr lang="en"/>
               <a:t>‹#›</a:t>
             </a:fld>
+            <a:endParaRPr lang="en"/>
           </a:p>
         </p:txBody>
       </p:sp>
@@ -2525,11 +2799,11 @@
 </file>
 
 <file path=ppt/slideLayouts/slideLayout6.xml><?xml version="1.0" encoding="utf-8"?>
-<p:sldLayout xmlns:a="http://schemas.openxmlformats.org/drawingml/2006/main" xmlns:r="http://schemas.openxmlformats.org/officeDocument/2006/relationships" xmlns:mc="http://schemas.openxmlformats.org/markup-compatibility/2006" xmlns:mv="urn:schemas-microsoft-com:mac:vml" xmlns:p="http://schemas.openxmlformats.org/presentationml/2006/main" xmlns:c="http://schemas.openxmlformats.org/drawingml/2006/chart" xmlns:dgm="http://schemas.openxmlformats.org/drawingml/2006/diagram" xmlns:o="urn:schemas-microsoft-com:office:office" xmlns:v="urn:schemas-microsoft-com:vml" xmlns:pvml="urn:schemas-microsoft-com:office:powerpoint" xmlns:com="http://schemas.openxmlformats.org/drawingml/2006/compatibility" xmlns:p14="http://schemas.microsoft.com/office/powerpoint/2010/main" type="blank">
+<p:sldLayout xmlns:a="http://schemas.openxmlformats.org/drawingml/2006/main" xmlns:r="http://schemas.openxmlformats.org/officeDocument/2006/relationships" xmlns:p="http://schemas.openxmlformats.org/presentationml/2006/main" type="blank">
   <p:cSld name="Blank">
     <p:spTree>
       <p:nvGrpSpPr>
-        <p:cNvPr id="27" name="Shape 27"/>
+        <p:cNvPr id="1" name="Shape 27"/>
         <p:cNvGrpSpPr/>
         <p:nvPr/>
       </p:nvGrpSpPr>
@@ -2544,9 +2818,11 @@
       <p:sp>
         <p:nvSpPr>
           <p:cNvPr id="28" name="Shape 28"/>
-          <p:cNvSpPr txBox="1"/>
+          <p:cNvSpPr txBox="1">
+            <a:spLocks noGrp="1"/>
+          </p:cNvSpPr>
           <p:nvPr>
-            <p:ph idx="12" type="sldNum"/>
+            <p:ph type="sldNum" idx="12"/>
           </p:nvPr>
         </p:nvSpPr>
         <p:spPr>
@@ -2559,7 +2835,7 @@
           </a:prstGeom>
         </p:spPr>
         <p:txBody>
-          <a:bodyPr anchorCtr="0" anchor="ctr" bIns="91425" lIns="91425" rIns="91425" tIns="91425">
+          <a:bodyPr lIns="91425" tIns="91425" rIns="91425" bIns="91425" anchor="ctr" anchorCtr="0">
             <a:noAutofit/>
           </a:bodyPr>
           <a:lstStyle>
@@ -2582,6 +2858,7 @@
               <a:rPr lang="en"/>
               <a:t>‹#›</a:t>
             </a:fld>
+            <a:endParaRPr lang="en"/>
           </a:p>
         </p:txBody>
       </p:sp>
@@ -2594,18 +2871,19 @@
 </file>
 
 <file path=ppt/slideMasters/slideMaster1.xml><?xml version="1.0" encoding="utf-8"?>
-<p:sldMaster xmlns:a="http://schemas.openxmlformats.org/drawingml/2006/main" xmlns:r="http://schemas.openxmlformats.org/officeDocument/2006/relationships" xmlns:mc="http://schemas.openxmlformats.org/markup-compatibility/2006" xmlns:mv="urn:schemas-microsoft-com:mac:vml" xmlns:p="http://schemas.openxmlformats.org/presentationml/2006/main" xmlns:c="http://schemas.openxmlformats.org/drawingml/2006/chart" xmlns:dgm="http://schemas.openxmlformats.org/drawingml/2006/diagram" xmlns:o="urn:schemas-microsoft-com:office:office" xmlns:v="urn:schemas-microsoft-com:vml" xmlns:pvml="urn:schemas-microsoft-com:office:powerpoint" xmlns:com="http://schemas.openxmlformats.org/drawingml/2006/compatibility" xmlns:p14="http://schemas.microsoft.com/office/powerpoint/2010/main">
+<p:sldMaster xmlns:a="http://schemas.openxmlformats.org/drawingml/2006/main" xmlns:r="http://schemas.openxmlformats.org/officeDocument/2006/relationships" xmlns:p="http://schemas.openxmlformats.org/presentationml/2006/main">
   <p:cSld>
     <p:bg>
       <p:bgPr>
         <a:solidFill>
           <a:schemeClr val="lt1"/>
         </a:solidFill>
+        <a:effectLst/>
       </p:bgPr>
     </p:bg>
     <p:spTree>
       <p:nvGrpSpPr>
-        <p:cNvPr id="4" name="Shape 4"/>
+        <p:cNvPr id="1" name="Shape 4"/>
         <p:cNvGrpSpPr/>
         <p:nvPr/>
       </p:nvGrpSpPr>
@@ -2620,7 +2898,9 @@
       <p:sp>
         <p:nvSpPr>
           <p:cNvPr id="5" name="Shape 5"/>
-          <p:cNvSpPr txBox="1"/>
+          <p:cNvSpPr txBox="1">
+            <a:spLocks noGrp="1"/>
+          </p:cNvSpPr>
           <p:nvPr>
             <p:ph type="title"/>
           </p:nvPr>
@@ -2639,7 +2919,7 @@
           </a:ln>
         </p:spPr>
         <p:txBody>
-          <a:bodyPr anchorCtr="0" anchor="b" bIns="91425" lIns="91425" rIns="91425" tIns="91425"/>
+          <a:bodyPr lIns="91425" tIns="91425" rIns="91425" bIns="91425" anchor="b" anchorCtr="0"/>
           <a:lstStyle>
             <a:lvl1pPr>
               <a:spcBef>
@@ -2650,7 +2930,7 @@
               </a:buClr>
               <a:buSzPct val="100000"/>
               <a:buNone/>
-              <a:defRPr b="1" sz="3600">
+              <a:defRPr sz="3600" b="1">
                 <a:solidFill>
                   <a:schemeClr val="dk1"/>
                 </a:solidFill>
@@ -2665,7 +2945,7 @@
               </a:buClr>
               <a:buSzPct val="100000"/>
               <a:buNone/>
-              <a:defRPr b="1" sz="3600">
+              <a:defRPr sz="3600" b="1">
                 <a:solidFill>
                   <a:schemeClr val="dk1"/>
                 </a:solidFill>
@@ -2680,7 +2960,7 @@
               </a:buClr>
               <a:buSzPct val="100000"/>
               <a:buNone/>
-              <a:defRPr b="1" sz="3600">
+              <a:defRPr sz="3600" b="1">
                 <a:solidFill>
                   <a:schemeClr val="dk1"/>
                 </a:solidFill>
@@ -2695,7 +2975,7 @@
               </a:buClr>
               <a:buSzPct val="100000"/>
               <a:buNone/>
-              <a:defRPr b="1" sz="3600">
+              <a:defRPr sz="3600" b="1">
                 <a:solidFill>
                   <a:schemeClr val="dk1"/>
                 </a:solidFill>
@@ -2710,7 +2990,7 @@
               </a:buClr>
               <a:buSzPct val="100000"/>
               <a:buNone/>
-              <a:defRPr b="1" sz="3600">
+              <a:defRPr sz="3600" b="1">
                 <a:solidFill>
                   <a:schemeClr val="dk1"/>
                 </a:solidFill>
@@ -2725,7 +3005,7 @@
               </a:buClr>
               <a:buSzPct val="100000"/>
               <a:buNone/>
-              <a:defRPr b="1" sz="3600">
+              <a:defRPr sz="3600" b="1">
                 <a:solidFill>
                   <a:schemeClr val="dk1"/>
                 </a:solidFill>
@@ -2740,7 +3020,7 @@
               </a:buClr>
               <a:buSzPct val="100000"/>
               <a:buNone/>
-              <a:defRPr b="1" sz="3600">
+              <a:defRPr sz="3600" b="1">
                 <a:solidFill>
                   <a:schemeClr val="dk1"/>
                 </a:solidFill>
@@ -2755,7 +3035,7 @@
               </a:buClr>
               <a:buSzPct val="100000"/>
               <a:buNone/>
-              <a:defRPr b="1" sz="3600">
+              <a:defRPr sz="3600" b="1">
                 <a:solidFill>
                   <a:schemeClr val="dk1"/>
                 </a:solidFill>
@@ -2770,22 +3050,26 @@
               </a:buClr>
               <a:buSzPct val="100000"/>
               <a:buNone/>
-              <a:defRPr b="1" sz="3600">
+              <a:defRPr sz="3600" b="1">
                 <a:solidFill>
                   <a:schemeClr val="dk1"/>
                 </a:solidFill>
               </a:defRPr>
             </a:lvl9pPr>
           </a:lstStyle>
-          <a:p/>
+          <a:p>
+            <a:endParaRPr/>
+          </a:p>
         </p:txBody>
       </p:sp>
       <p:sp>
         <p:nvSpPr>
           <p:cNvPr id="6" name="Shape 6"/>
-          <p:cNvSpPr txBox="1"/>
+          <p:cNvSpPr txBox="1">
+            <a:spLocks noGrp="1"/>
+          </p:cNvSpPr>
           <p:nvPr>
-            <p:ph idx="1" type="body"/>
+            <p:ph type="body" idx="1"/>
           </p:nvPr>
         </p:nvSpPr>
         <p:spPr>
@@ -2802,7 +3086,7 @@
           </a:ln>
         </p:spPr>
         <p:txBody>
-          <a:bodyPr anchorCtr="0" anchor="t" bIns="91425" lIns="91425" rIns="91425" tIns="91425"/>
+          <a:bodyPr lIns="91425" tIns="91425" rIns="91425" bIns="91425" anchor="t" anchorCtr="0"/>
           <a:lstStyle>
             <a:lvl1pPr>
               <a:spcBef>
@@ -2931,15 +3215,19 @@
               </a:defRPr>
             </a:lvl9pPr>
           </a:lstStyle>
-          <a:p/>
+          <a:p>
+            <a:endParaRPr/>
+          </a:p>
         </p:txBody>
       </p:sp>
       <p:sp>
         <p:nvSpPr>
           <p:cNvPr id="7" name="Shape 7"/>
-          <p:cNvSpPr txBox="1"/>
+          <p:cNvSpPr txBox="1">
+            <a:spLocks noGrp="1"/>
+          </p:cNvSpPr>
           <p:nvPr>
-            <p:ph idx="12" type="sldNum"/>
+            <p:ph type="sldNum" idx="12"/>
           </p:nvPr>
         </p:nvSpPr>
         <p:spPr>
@@ -2956,7 +3244,7 @@
           </a:ln>
         </p:spPr>
         <p:txBody>
-          <a:bodyPr anchorCtr="0" anchor="ctr" bIns="91425" lIns="91425" rIns="91425" tIns="91425">
+          <a:bodyPr lIns="91425" tIns="91425" rIns="91425" bIns="91425" anchor="ctr" anchorCtr="0">
             <a:noAutofit/>
           </a:bodyPr>
           <a:lstStyle>
@@ -2983,12 +3271,13 @@
               <a:rPr lang="en"/>
               <a:t>‹#›</a:t>
             </a:fld>
+            <a:endParaRPr lang="en"/>
           </a:p>
         </p:txBody>
       </p:sp>
     </p:spTree>
   </p:cSld>
-  <p:clrMap accent1="accent1" accent2="accent2" accent3="accent3" accent4="accent4" accent5="accent5" accent6="accent6" bg1="lt1" bg2="dk2" tx1="dk1" tx2="lt2" folHlink="folHlink" hlink="hlink"/>
+  <p:clrMap bg1="lt1" tx1="dk1" bg2="dk2" tx2="lt2" accent1="accent1" accent2="accent2" accent3="accent3" accent4="accent4" accent5="accent5" accent6="accent6" hlink="hlink" folHlink="folHlink"/>
   <p:sldLayoutIdLst>
     <p:sldLayoutId id="2147483648" r:id="rId1"/>
     <p:sldLayoutId id="2147483649" r:id="rId2"/>
@@ -2997,10 +3286,10 @@
     <p:sldLayoutId id="2147483652" r:id="rId5"/>
     <p:sldLayoutId id="2147483653" r:id="rId6"/>
   </p:sldLayoutIdLst>
-  <p:hf dt="0" ftr="0" hdr="0" sldNum="0"/>
+  <p:hf sldNum="0" hdr="0" ftr="0" dt="0"/>
   <p:txStyles>
     <p:titleStyle>
-      <a:defPPr marR="0" rtl="0" algn="l">
+      <a:defPPr marR="0" algn="l" rtl="0">
         <a:lnSpc>
           <a:spcPct val="100000"/>
         </a:lnSpc>
@@ -3011,7 +3300,7 @@
           <a:spcPts val="0"/>
         </a:spcAft>
       </a:defPPr>
-      <a:lvl1pPr marR="0" rtl="0" algn="l">
+      <a:lvl1pPr marR="0" algn="l" rtl="0">
         <a:lnSpc>
           <a:spcPct val="100000"/>
         </a:lnSpc>
@@ -3022,7 +3311,7 @@
           <a:spcPts val="0"/>
         </a:spcAft>
         <a:buNone/>
-        <a:defRPr b="0" baseline="0" i="0" sz="1400" u="none" cap="none" strike="noStrike">
+        <a:defRPr sz="1400" b="0" i="0" u="none" strike="noStrike" cap="none" baseline="0">
           <a:solidFill>
             <a:srgbClr val="000000"/>
           </a:solidFill>
@@ -3033,7 +3322,7 @@
           <a:rtl val="0"/>
         </a:defRPr>
       </a:lvl1pPr>
-      <a:lvl2pPr marR="0" rtl="0" algn="l">
+      <a:lvl2pPr marR="0" algn="l" rtl="0">
         <a:lnSpc>
           <a:spcPct val="100000"/>
         </a:lnSpc>
@@ -3044,7 +3333,7 @@
           <a:spcPts val="0"/>
         </a:spcAft>
         <a:buNone/>
-        <a:defRPr b="0" baseline="0" i="0" sz="1400" u="none" cap="none" strike="noStrike">
+        <a:defRPr sz="1400" b="0" i="0" u="none" strike="noStrike" cap="none" baseline="0">
           <a:solidFill>
             <a:srgbClr val="000000"/>
           </a:solidFill>
@@ -3057,7 +3346,7 @@
       </a:lvl2pPr>
     </p:titleStyle>
     <p:bodyStyle>
-      <a:defPPr marR="0" rtl="0" algn="l">
+      <a:defPPr marR="0" algn="l" rtl="0">
         <a:lnSpc>
           <a:spcPct val="100000"/>
         </a:lnSpc>
@@ -3068,7 +3357,7 @@
           <a:spcPts val="0"/>
         </a:spcAft>
       </a:defPPr>
-      <a:lvl1pPr marR="0" rtl="0" algn="l">
+      <a:lvl1pPr marR="0" algn="l" rtl="0">
         <a:lnSpc>
           <a:spcPct val="100000"/>
         </a:lnSpc>
@@ -3079,7 +3368,7 @@
           <a:spcPts val="0"/>
         </a:spcAft>
         <a:buNone/>
-        <a:defRPr b="0" baseline="0" i="0" sz="1400" u="none" cap="none" strike="noStrike">
+        <a:defRPr sz="1400" b="0" i="0" u="none" strike="noStrike" cap="none" baseline="0">
           <a:solidFill>
             <a:srgbClr val="000000"/>
           </a:solidFill>
@@ -3090,7 +3379,7 @@
           <a:rtl val="0"/>
         </a:defRPr>
       </a:lvl1pPr>
-      <a:lvl2pPr marR="0" rtl="0" algn="l">
+      <a:lvl2pPr marR="0" algn="l" rtl="0">
         <a:lnSpc>
           <a:spcPct val="100000"/>
         </a:lnSpc>
@@ -3101,7 +3390,7 @@
           <a:spcPts val="0"/>
         </a:spcAft>
         <a:buNone/>
-        <a:defRPr b="0" baseline="0" i="0" sz="1400" u="none" cap="none" strike="noStrike">
+        <a:defRPr sz="1400" b="0" i="0" u="none" strike="noStrike" cap="none" baseline="0">
           <a:solidFill>
             <a:srgbClr val="000000"/>
           </a:solidFill>
@@ -3112,7 +3401,7 @@
           <a:rtl val="0"/>
         </a:defRPr>
       </a:lvl2pPr>
-      <a:lvl3pPr marR="0" rtl="0" algn="l">
+      <a:lvl3pPr marR="0" algn="l" rtl="0">
         <a:lnSpc>
           <a:spcPct val="100000"/>
         </a:lnSpc>
@@ -3123,7 +3412,7 @@
           <a:spcPts val="0"/>
         </a:spcAft>
         <a:buNone/>
-        <a:defRPr b="0" baseline="0" i="0" sz="1400" u="none" cap="none" strike="noStrike">
+        <a:defRPr sz="1400" b="0" i="0" u="none" strike="noStrike" cap="none" baseline="0">
           <a:solidFill>
             <a:srgbClr val="000000"/>
           </a:solidFill>
@@ -3134,7 +3423,7 @@
           <a:rtl val="0"/>
         </a:defRPr>
       </a:lvl3pPr>
-      <a:lvl4pPr marR="0" rtl="0" algn="l">
+      <a:lvl4pPr marR="0" algn="l" rtl="0">
         <a:lnSpc>
           <a:spcPct val="100000"/>
         </a:lnSpc>
@@ -3145,7 +3434,7 @@
           <a:spcPts val="0"/>
         </a:spcAft>
         <a:buNone/>
-        <a:defRPr b="0" baseline="0" i="0" sz="1400" u="none" cap="none" strike="noStrike">
+        <a:defRPr sz="1400" b="0" i="0" u="none" strike="noStrike" cap="none" baseline="0">
           <a:solidFill>
             <a:srgbClr val="000000"/>
           </a:solidFill>
@@ -3156,7 +3445,7 @@
           <a:rtl val="0"/>
         </a:defRPr>
       </a:lvl4pPr>
-      <a:lvl5pPr marR="0" rtl="0" algn="l">
+      <a:lvl5pPr marR="0" algn="l" rtl="0">
         <a:lnSpc>
           <a:spcPct val="100000"/>
         </a:lnSpc>
@@ -3167,7 +3456,7 @@
           <a:spcPts val="0"/>
         </a:spcAft>
         <a:buNone/>
-        <a:defRPr b="0" baseline="0" i="0" sz="1400" u="none" cap="none" strike="noStrike">
+        <a:defRPr sz="1400" b="0" i="0" u="none" strike="noStrike" cap="none" baseline="0">
           <a:solidFill>
             <a:srgbClr val="000000"/>
           </a:solidFill>
@@ -3178,7 +3467,7 @@
           <a:rtl val="0"/>
         </a:defRPr>
       </a:lvl5pPr>
-      <a:lvl6pPr marR="0" rtl="0" algn="l">
+      <a:lvl6pPr marR="0" algn="l" rtl="0">
         <a:lnSpc>
           <a:spcPct val="100000"/>
         </a:lnSpc>
@@ -3189,7 +3478,7 @@
           <a:spcPts val="0"/>
         </a:spcAft>
         <a:buNone/>
-        <a:defRPr b="0" baseline="0" i="0" sz="1400" u="none" cap="none" strike="noStrike">
+        <a:defRPr sz="1400" b="0" i="0" u="none" strike="noStrike" cap="none" baseline="0">
           <a:solidFill>
             <a:srgbClr val="000000"/>
           </a:solidFill>
@@ -3200,7 +3489,7 @@
           <a:rtl val="0"/>
         </a:defRPr>
       </a:lvl6pPr>
-      <a:lvl7pPr marR="0" rtl="0" algn="l">
+      <a:lvl7pPr marR="0" algn="l" rtl="0">
         <a:lnSpc>
           <a:spcPct val="100000"/>
         </a:lnSpc>
@@ -3211,7 +3500,7 @@
           <a:spcPts val="0"/>
         </a:spcAft>
         <a:buNone/>
-        <a:defRPr b="0" baseline="0" i="0" sz="1400" u="none" cap="none" strike="noStrike">
+        <a:defRPr sz="1400" b="0" i="0" u="none" strike="noStrike" cap="none" baseline="0">
           <a:solidFill>
             <a:srgbClr val="000000"/>
           </a:solidFill>
@@ -3222,7 +3511,7 @@
           <a:rtl val="0"/>
         </a:defRPr>
       </a:lvl7pPr>
-      <a:lvl8pPr marR="0" rtl="0" algn="l">
+      <a:lvl8pPr marR="0" algn="l" rtl="0">
         <a:lnSpc>
           <a:spcPct val="100000"/>
         </a:lnSpc>
@@ -3233,7 +3522,7 @@
           <a:spcPts val="0"/>
         </a:spcAft>
         <a:buNone/>
-        <a:defRPr b="0" baseline="0" i="0" sz="1400" u="none" cap="none" strike="noStrike">
+        <a:defRPr sz="1400" b="0" i="0" u="none" strike="noStrike" cap="none" baseline="0">
           <a:solidFill>
             <a:srgbClr val="000000"/>
           </a:solidFill>
@@ -3244,7 +3533,7 @@
           <a:rtl val="0"/>
         </a:defRPr>
       </a:lvl8pPr>
-      <a:lvl9pPr marR="0" rtl="0" algn="l">
+      <a:lvl9pPr marR="0" algn="l" rtl="0">
         <a:lnSpc>
           <a:spcPct val="100000"/>
         </a:lnSpc>
@@ -3255,7 +3544,7 @@
           <a:spcPts val="0"/>
         </a:spcAft>
         <a:buNone/>
-        <a:defRPr b="0" baseline="0" i="0" sz="1400" u="none" cap="none" strike="noStrike">
+        <a:defRPr sz="1400" b="0" i="0" u="none" strike="noStrike" cap="none" baseline="0">
           <a:solidFill>
             <a:srgbClr val="000000"/>
           </a:solidFill>
@@ -3268,7 +3557,7 @@
       </a:lvl9pPr>
     </p:bodyStyle>
     <p:otherStyle>
-      <a:defPPr marR="0" rtl="0" algn="l">
+      <a:defPPr marR="0" algn="l" rtl="0">
         <a:lnSpc>
           <a:spcPct val="100000"/>
         </a:lnSpc>
@@ -3279,7 +3568,7 @@
           <a:spcPts val="0"/>
         </a:spcAft>
       </a:defPPr>
-      <a:lvl1pPr marR="0" rtl="0" algn="l">
+      <a:lvl1pPr marR="0" algn="l" rtl="0">
         <a:lnSpc>
           <a:spcPct val="100000"/>
         </a:lnSpc>
@@ -3290,7 +3579,7 @@
           <a:spcPts val="0"/>
         </a:spcAft>
         <a:buNone/>
-        <a:defRPr b="0" baseline="0" i="0" sz="1400" u="none" cap="none" strike="noStrike">
+        <a:defRPr sz="1400" b="0" i="0" u="none" strike="noStrike" cap="none" baseline="0">
           <a:solidFill>
             <a:srgbClr val="000000"/>
           </a:solidFill>
@@ -3301,7 +3590,7 @@
           <a:rtl val="0"/>
         </a:defRPr>
       </a:lvl1pPr>
-      <a:lvl2pPr marR="0" rtl="0" algn="l">
+      <a:lvl2pPr marR="0" algn="l" rtl="0">
         <a:lnSpc>
           <a:spcPct val="100000"/>
         </a:lnSpc>
@@ -3312,7 +3601,7 @@
           <a:spcPts val="0"/>
         </a:spcAft>
         <a:buNone/>
-        <a:defRPr b="0" baseline="0" i="0" sz="1400" u="none" cap="none" strike="noStrike">
+        <a:defRPr sz="1400" b="0" i="0" u="none" strike="noStrike" cap="none" baseline="0">
           <a:solidFill>
             <a:srgbClr val="000000"/>
           </a:solidFill>
@@ -3323,7 +3612,7 @@
           <a:rtl val="0"/>
         </a:defRPr>
       </a:lvl2pPr>
-      <a:lvl3pPr marR="0" rtl="0" algn="l">
+      <a:lvl3pPr marR="0" algn="l" rtl="0">
         <a:lnSpc>
           <a:spcPct val="100000"/>
         </a:lnSpc>
@@ -3334,7 +3623,7 @@
           <a:spcPts val="0"/>
         </a:spcAft>
         <a:buNone/>
-        <a:defRPr b="0" baseline="0" i="0" sz="1400" u="none" cap="none" strike="noStrike">
+        <a:defRPr sz="1400" b="0" i="0" u="none" strike="noStrike" cap="none" baseline="0">
           <a:solidFill>
             <a:srgbClr val="000000"/>
           </a:solidFill>
@@ -3345,7 +3634,7 @@
           <a:rtl val="0"/>
         </a:defRPr>
       </a:lvl3pPr>
-      <a:lvl4pPr marR="0" rtl="0" algn="l">
+      <a:lvl4pPr marR="0" algn="l" rtl="0">
         <a:lnSpc>
           <a:spcPct val="100000"/>
         </a:lnSpc>
@@ -3356,7 +3645,7 @@
           <a:spcPts val="0"/>
         </a:spcAft>
         <a:buNone/>
-        <a:defRPr b="0" baseline="0" i="0" sz="1400" u="none" cap="none" strike="noStrike">
+        <a:defRPr sz="1400" b="0" i="0" u="none" strike="noStrike" cap="none" baseline="0">
           <a:solidFill>
             <a:srgbClr val="000000"/>
           </a:solidFill>
@@ -3367,7 +3656,7 @@
           <a:rtl val="0"/>
         </a:defRPr>
       </a:lvl4pPr>
-      <a:lvl5pPr marR="0" rtl="0" algn="l">
+      <a:lvl5pPr marR="0" algn="l" rtl="0">
         <a:lnSpc>
           <a:spcPct val="100000"/>
         </a:lnSpc>
@@ -3378,7 +3667,7 @@
           <a:spcPts val="0"/>
         </a:spcAft>
         <a:buNone/>
-        <a:defRPr b="0" baseline="0" i="0" sz="1400" u="none" cap="none" strike="noStrike">
+        <a:defRPr sz="1400" b="0" i="0" u="none" strike="noStrike" cap="none" baseline="0">
           <a:solidFill>
             <a:srgbClr val="000000"/>
           </a:solidFill>
@@ -3389,7 +3678,7 @@
           <a:rtl val="0"/>
         </a:defRPr>
       </a:lvl5pPr>
-      <a:lvl6pPr marR="0" rtl="0" algn="l">
+      <a:lvl6pPr marR="0" algn="l" rtl="0">
         <a:lnSpc>
           <a:spcPct val="100000"/>
         </a:lnSpc>
@@ -3400,7 +3689,7 @@
           <a:spcPts val="0"/>
         </a:spcAft>
         <a:buNone/>
-        <a:defRPr b="0" baseline="0" i="0" sz="1400" u="none" cap="none" strike="noStrike">
+        <a:defRPr sz="1400" b="0" i="0" u="none" strike="noStrike" cap="none" baseline="0">
           <a:solidFill>
             <a:srgbClr val="000000"/>
           </a:solidFill>
@@ -3411,7 +3700,7 @@
           <a:rtl val="0"/>
         </a:defRPr>
       </a:lvl6pPr>
-      <a:lvl7pPr marR="0" rtl="0" algn="l">
+      <a:lvl7pPr marR="0" algn="l" rtl="0">
         <a:lnSpc>
           <a:spcPct val="100000"/>
         </a:lnSpc>
@@ -3422,7 +3711,7 @@
           <a:spcPts val="0"/>
         </a:spcAft>
         <a:buNone/>
-        <a:defRPr b="0" baseline="0" i="0" sz="1400" u="none" cap="none" strike="noStrike">
+        <a:defRPr sz="1400" b="0" i="0" u="none" strike="noStrike" cap="none" baseline="0">
           <a:solidFill>
             <a:srgbClr val="000000"/>
           </a:solidFill>
@@ -3433,7 +3722,7 @@
           <a:rtl val="0"/>
         </a:defRPr>
       </a:lvl7pPr>
-      <a:lvl8pPr marR="0" rtl="0" algn="l">
+      <a:lvl8pPr marR="0" algn="l" rtl="0">
         <a:lnSpc>
           <a:spcPct val="100000"/>
         </a:lnSpc>
@@ -3444,7 +3733,7 @@
           <a:spcPts val="0"/>
         </a:spcAft>
         <a:buNone/>
-        <a:defRPr b="0" baseline="0" i="0" sz="1400" u="none" cap="none" strike="noStrike">
+        <a:defRPr sz="1400" b="0" i="0" u="none" strike="noStrike" cap="none" baseline="0">
           <a:solidFill>
             <a:srgbClr val="000000"/>
           </a:solidFill>
@@ -3455,7 +3744,7 @@
           <a:rtl val="0"/>
         </a:defRPr>
       </a:lvl8pPr>
-      <a:lvl9pPr marR="0" rtl="0" algn="l">
+      <a:lvl9pPr marR="0" algn="l" rtl="0">
         <a:lnSpc>
           <a:spcPct val="100000"/>
         </a:lnSpc>
@@ -3466,7 +3755,7 @@
           <a:spcPts val="0"/>
         </a:spcAft>
         <a:buNone/>
-        <a:defRPr b="0" baseline="0" i="0" sz="1400" u="none" cap="none" strike="noStrike">
+        <a:defRPr sz="1400" b="0" i="0" u="none" strike="noStrike" cap="none" baseline="0">
           <a:solidFill>
             <a:srgbClr val="000000"/>
           </a:solidFill>
@@ -3483,11 +3772,11 @@
 </file>
 
 <file path=ppt/slides/slide1.xml><?xml version="1.0" encoding="utf-8"?>
-<p:sld xmlns:a="http://schemas.openxmlformats.org/drawingml/2006/main" xmlns:r="http://schemas.openxmlformats.org/officeDocument/2006/relationships" xmlns:mc="http://schemas.openxmlformats.org/markup-compatibility/2006" xmlns:mv="urn:schemas-microsoft-com:mac:vml" xmlns:p="http://schemas.openxmlformats.org/presentationml/2006/main" xmlns:c="http://schemas.openxmlformats.org/drawingml/2006/chart" xmlns:dgm="http://schemas.openxmlformats.org/drawingml/2006/diagram" xmlns:o="urn:schemas-microsoft-com:office:office" xmlns:v="urn:schemas-microsoft-com:vml" xmlns:pvml="urn:schemas-microsoft-com:office:powerpoint" xmlns:com="http://schemas.openxmlformats.org/drawingml/2006/compatibility" xmlns:p14="http://schemas.microsoft.com/office/powerpoint/2010/main">
+<p:sld xmlns:a="http://schemas.openxmlformats.org/drawingml/2006/main" xmlns:r="http://schemas.openxmlformats.org/officeDocument/2006/relationships" xmlns:p="http://schemas.openxmlformats.org/presentationml/2006/main">
   <p:cSld>
     <p:spTree>
       <p:nvGrpSpPr>
-        <p:cNvPr id="29" name="Shape 29"/>
+        <p:cNvPr id="1" name="Shape 29"/>
         <p:cNvGrpSpPr/>
         <p:nvPr/>
       </p:nvGrpSpPr>
@@ -3502,7 +3791,9 @@
       <p:sp>
         <p:nvSpPr>
           <p:cNvPr id="30" name="Shape 30"/>
-          <p:cNvSpPr txBox="1"/>
+          <p:cNvSpPr txBox="1">
+            <a:spLocks noGrp="1"/>
+          </p:cNvSpPr>
           <p:nvPr>
             <p:ph type="ctrTitle"/>
           </p:nvPr>
@@ -3517,7 +3808,7 @@
           </a:prstGeom>
         </p:spPr>
         <p:txBody>
-          <a:bodyPr anchorCtr="0" anchor="b" bIns="91425" lIns="91425" rIns="91425" tIns="91425">
+          <a:bodyPr lIns="91425" tIns="91425" rIns="91425" bIns="91425" anchor="b" anchorCtr="0">
             <a:noAutofit/>
           </a:bodyPr>
           <a:lstStyle/>
@@ -3538,9 +3829,11 @@
       <p:sp>
         <p:nvSpPr>
           <p:cNvPr id="31" name="Shape 31"/>
-          <p:cNvSpPr txBox="1"/>
+          <p:cNvSpPr txBox="1">
+            <a:spLocks noGrp="1"/>
+          </p:cNvSpPr>
           <p:nvPr>
-            <p:ph idx="1" type="subTitle"/>
+            <p:ph type="subTitle" idx="1"/>
           </p:nvPr>
         </p:nvSpPr>
         <p:spPr>
@@ -3553,48 +3846,39 @@
           </a:prstGeom>
         </p:spPr>
         <p:txBody>
-          <a:bodyPr anchorCtr="0" anchor="t" bIns="91425" lIns="91425" rIns="91425" tIns="91425">
+          <a:bodyPr lIns="91425" tIns="91425" rIns="91425" bIns="91425" anchor="t" anchorCtr="0">
             <a:noAutofit/>
           </a:bodyPr>
           <a:lstStyle/>
           <a:p>
-            <a:pPr indent="457200" marL="3657600" rtl="0" algn="ctr">
-              <a:spcBef>
-                <a:spcPts val="0"/>
-              </a:spcBef>
-              <a:buNone/>
-            </a:pPr>
-            <a:r>
-              <a:t/>
-            </a:r>
+            <a:pPr marL="3657600" indent="457200" algn="ctr" rtl="0">
+              <a:spcBef>
+                <a:spcPts val="0"/>
+              </a:spcBef>
+              <a:buNone/>
+            </a:pPr>
             <a:endParaRPr sz="1800" u="sng"/>
           </a:p>
           <a:p>
-            <a:pPr indent="457200" marL="3657600" rtl="0" algn="ctr">
-              <a:spcBef>
-                <a:spcPts val="0"/>
-              </a:spcBef>
-              <a:buNone/>
-            </a:pPr>
-            <a:r>
-              <a:t/>
-            </a:r>
+            <a:pPr marL="3657600" indent="457200" algn="ctr" rtl="0">
+              <a:spcBef>
+                <a:spcPts val="0"/>
+              </a:spcBef>
+              <a:buNone/>
+            </a:pPr>
             <a:endParaRPr sz="1800" u="sng"/>
           </a:p>
           <a:p>
-            <a:pPr indent="457200" marL="3657600" rtl="0" algn="ctr">
-              <a:spcBef>
-                <a:spcPts val="0"/>
-              </a:spcBef>
-              <a:buNone/>
-            </a:pPr>
-            <a:r>
-              <a:t/>
-            </a:r>
+            <a:pPr marL="3657600" indent="457200" algn="ctr" rtl="0">
+              <a:spcBef>
+                <a:spcPts val="0"/>
+              </a:spcBef>
+              <a:buNone/>
+            </a:pPr>
             <a:endParaRPr sz="1800" u="sng"/>
           </a:p>
           <a:p>
-            <a:pPr indent="457200" marL="3657600" rtl="0" algn="ctr">
+            <a:pPr marL="3657600" indent="457200" algn="ctr" rtl="0">
               <a:spcBef>
                 <a:spcPts val="0"/>
               </a:spcBef>
@@ -3606,7 +3890,7 @@
             </a:r>
           </a:p>
           <a:p>
-            <a:pPr indent="457200" lvl="0" marL="3657600" rtl="0" algn="ctr">
+            <a:pPr marL="3657600" lvl="0" indent="457200" algn="ctr" rtl="0">
               <a:spcBef>
                 <a:spcPts val="0"/>
               </a:spcBef>
@@ -3623,7 +3907,7 @@
             </a:r>
           </a:p>
           <a:p>
-            <a:pPr indent="457200" marL="4572000" rtl="0" algn="l">
+            <a:pPr marL="4572000" indent="457200" algn="l" rtl="0">
               <a:spcBef>
                 <a:spcPts val="0"/>
               </a:spcBef>
@@ -3635,7 +3919,7 @@
             </a:r>
           </a:p>
           <a:p>
-            <a:pPr indent="0" marL="5029200" rtl="0" algn="l">
+            <a:pPr marL="5029200" indent="0" algn="l" rtl="0">
               <a:spcBef>
                 <a:spcPts val="0"/>
               </a:spcBef>
@@ -3647,7 +3931,7 @@
             </a:r>
           </a:p>
           <a:p>
-            <a:pPr rtl="0" algn="r">
+            <a:pPr algn="r" rtl="0">
               <a:spcBef>
                 <a:spcPts val="0"/>
               </a:spcBef>
@@ -3665,9 +3949,6 @@
               </a:spcBef>
               <a:buNone/>
             </a:pPr>
-            <a:r>
-              <a:t/>
-            </a:r>
             <a:endParaRPr/>
           </a:p>
         </p:txBody>
@@ -3684,11 +3965,11 @@
 </file>
 
 <file path=ppt/slides/slide10.xml><?xml version="1.0" encoding="utf-8"?>
-<p:sld xmlns:a="http://schemas.openxmlformats.org/drawingml/2006/main" xmlns:r="http://schemas.openxmlformats.org/officeDocument/2006/relationships" xmlns:mc="http://schemas.openxmlformats.org/markup-compatibility/2006" xmlns:mv="urn:schemas-microsoft-com:mac:vml" xmlns:p="http://schemas.openxmlformats.org/presentationml/2006/main" xmlns:c="http://schemas.openxmlformats.org/drawingml/2006/chart" xmlns:dgm="http://schemas.openxmlformats.org/drawingml/2006/diagram" xmlns:o="urn:schemas-microsoft-com:office:office" xmlns:v="urn:schemas-microsoft-com:vml" xmlns:pvml="urn:schemas-microsoft-com:office:powerpoint" xmlns:com="http://schemas.openxmlformats.org/drawingml/2006/compatibility" xmlns:p14="http://schemas.microsoft.com/office/powerpoint/2010/main">
+<p:sld xmlns:a="http://schemas.openxmlformats.org/drawingml/2006/main" xmlns:r="http://schemas.openxmlformats.org/officeDocument/2006/relationships" xmlns:p="http://schemas.openxmlformats.org/presentationml/2006/main">
   <p:cSld>
     <p:spTree>
       <p:nvGrpSpPr>
-        <p:cNvPr id="87" name="Shape 87"/>
+        <p:cNvPr id="1" name="Shape 87"/>
         <p:cNvGrpSpPr/>
         <p:nvPr/>
       </p:nvGrpSpPr>
@@ -3703,7 +3984,9 @@
       <p:sp>
         <p:nvSpPr>
           <p:cNvPr id="88" name="Shape 88"/>
-          <p:cNvSpPr txBox="1"/>
+          <p:cNvSpPr txBox="1">
+            <a:spLocks noGrp="1"/>
+          </p:cNvSpPr>
           <p:nvPr>
             <p:ph type="title"/>
           </p:nvPr>
@@ -3718,7 +4001,7 @@
           </a:prstGeom>
         </p:spPr>
         <p:txBody>
-          <a:bodyPr anchorCtr="0" anchor="b" bIns="91425" lIns="91425" rIns="91425" tIns="91425">
+          <a:bodyPr lIns="91425" tIns="91425" rIns="91425" bIns="91425" anchor="b" anchorCtr="0">
             <a:noAutofit/>
           </a:bodyPr>
           <a:lstStyle/>
@@ -3730,14 +4013,38 @@
               <a:buNone/>
             </a:pPr>
             <a:r>
-              <a:rPr b="0" lang="en" sz="2000">
+              <a:rPr lang="en" sz="2000" b="0" dirty="0">
                 <a:latin typeface="Calibri"/>
                 <a:ea typeface="Calibri"/>
                 <a:cs typeface="Calibri"/>
                 <a:sym typeface="Calibri"/>
               </a:rPr>
-              <a:t>5. Final output with count,max,min,Standard Deviation,25th,50th and 70th percentile can be seen in the Hadoop file system.</a:t>
+              <a:t>5. </a:t>
             </a:r>
+            <a:r>
+              <a:rPr lang="en" sz="2000" b="0">
+                <a:latin typeface="Calibri"/>
+                <a:ea typeface="Calibri"/>
+                <a:cs typeface="Calibri"/>
+                <a:sym typeface="Calibri"/>
+              </a:rPr>
+              <a:t>Final output with count,max,min,Standard Deviation,25th,50th and 70th percentile can be seen in the Hadoop file </a:t>
+            </a:r>
+            <a:r>
+              <a:rPr lang="en" sz="2000" b="0" smtClean="0">
+                <a:latin typeface="Calibri"/>
+                <a:ea typeface="Calibri"/>
+                <a:cs typeface="Calibri"/>
+                <a:sym typeface="Calibri"/>
+              </a:rPr>
+              <a:t>browser.</a:t>
+            </a:r>
+            <a:endParaRPr lang="en" sz="2000" b="0">
+              <a:latin typeface="Calibri"/>
+              <a:ea typeface="Calibri"/>
+              <a:cs typeface="Calibri"/>
+              <a:sym typeface="Calibri"/>
+            </a:endParaRPr>
           </a:p>
           <a:p>
             <a:pPr>
@@ -3746,19 +4053,18 @@
               </a:spcBef>
               <a:buNone/>
             </a:pPr>
-            <a:r>
-              <a:t/>
-            </a:r>
-            <a:endParaRPr sz="2000"/>
+            <a:endParaRPr sz="2000" dirty="0"/>
           </a:p>
         </p:txBody>
       </p:sp>
       <p:sp>
         <p:nvSpPr>
           <p:cNvPr id="89" name="Shape 89"/>
-          <p:cNvSpPr txBox="1"/>
+          <p:cNvSpPr txBox="1">
+            <a:spLocks noGrp="1"/>
+          </p:cNvSpPr>
           <p:nvPr>
-            <p:ph idx="1" type="body"/>
+            <p:ph type="body" idx="1"/>
           </p:nvPr>
         </p:nvSpPr>
         <p:spPr>
@@ -3771,7 +4077,7 @@
           </a:prstGeom>
         </p:spPr>
         <p:txBody>
-          <a:bodyPr anchorCtr="0" anchor="t" bIns="91425" lIns="91425" rIns="91425" tIns="91425">
+          <a:bodyPr lIns="91425" tIns="91425" rIns="91425" bIns="91425" anchor="t" anchorCtr="0">
             <a:noAutofit/>
           </a:bodyPr>
           <a:lstStyle/>
@@ -3782,9 +4088,6 @@
               </a:spcBef>
               <a:buNone/>
             </a:pPr>
-            <a:r>
-              <a:t/>
-            </a:r>
             <a:endParaRPr/>
           </a:p>
         </p:txBody>
@@ -3829,11 +4132,11 @@
 </file>
 
 <file path=ppt/slides/slide2.xml><?xml version="1.0" encoding="utf-8"?>
-<p:sld xmlns:a="http://schemas.openxmlformats.org/drawingml/2006/main" xmlns:r="http://schemas.openxmlformats.org/officeDocument/2006/relationships" xmlns:mc="http://schemas.openxmlformats.org/markup-compatibility/2006" xmlns:mv="urn:schemas-microsoft-com:mac:vml" xmlns:p="http://schemas.openxmlformats.org/presentationml/2006/main" xmlns:c="http://schemas.openxmlformats.org/drawingml/2006/chart" xmlns:dgm="http://schemas.openxmlformats.org/drawingml/2006/diagram" xmlns:o="urn:schemas-microsoft-com:office:office" xmlns:v="urn:schemas-microsoft-com:vml" xmlns:pvml="urn:schemas-microsoft-com:office:powerpoint" xmlns:com="http://schemas.openxmlformats.org/drawingml/2006/compatibility" xmlns:p14="http://schemas.microsoft.com/office/powerpoint/2010/main">
+<p:sld xmlns:a="http://schemas.openxmlformats.org/drawingml/2006/main" xmlns:r="http://schemas.openxmlformats.org/officeDocument/2006/relationships" xmlns:p="http://schemas.openxmlformats.org/presentationml/2006/main">
   <p:cSld>
     <p:spTree>
       <p:nvGrpSpPr>
-        <p:cNvPr id="35" name="Shape 35"/>
+        <p:cNvPr id="1" name="Shape 35"/>
         <p:cNvGrpSpPr/>
         <p:nvPr/>
       </p:nvGrpSpPr>
@@ -3848,7 +4151,9 @@
       <p:sp>
         <p:nvSpPr>
           <p:cNvPr id="36" name="Shape 36"/>
-          <p:cNvSpPr txBox="1"/>
+          <p:cNvSpPr txBox="1">
+            <a:spLocks noGrp="1"/>
+          </p:cNvSpPr>
           <p:nvPr>
             <p:ph type="title"/>
           </p:nvPr>
@@ -3863,7 +4168,7 @@
           </a:prstGeom>
         </p:spPr>
         <p:txBody>
-          <a:bodyPr anchorCtr="0" anchor="b" bIns="91425" lIns="91425" rIns="91425" tIns="91425">
+          <a:bodyPr lIns="91425" tIns="91425" rIns="91425" bIns="91425" anchor="b" anchorCtr="0">
             <a:noAutofit/>
           </a:bodyPr>
           <a:lstStyle/>
@@ -3889,9 +4194,11 @@
       <p:sp>
         <p:nvSpPr>
           <p:cNvPr id="37" name="Shape 37"/>
-          <p:cNvSpPr txBox="1"/>
+          <p:cNvSpPr txBox="1">
+            <a:spLocks noGrp="1"/>
+          </p:cNvSpPr>
           <p:nvPr>
-            <p:ph idx="1" type="body"/>
+            <p:ph type="body" idx="1"/>
           </p:nvPr>
         </p:nvSpPr>
         <p:spPr>
@@ -3904,7 +4211,7 @@
           </a:prstGeom>
         </p:spPr>
         <p:txBody>
-          <a:bodyPr anchorCtr="0" anchor="t" bIns="91425" lIns="91425" rIns="91425" tIns="91425">
+          <a:bodyPr lIns="91425" tIns="91425" rIns="91425" bIns="91425" anchor="t" anchorCtr="0">
             <a:noAutofit/>
           </a:bodyPr>
           <a:lstStyle/>
@@ -3982,9 +4289,6 @@
               </a:spcBef>
               <a:buNone/>
             </a:pPr>
-            <a:r>
-              <a:t/>
-            </a:r>
             <a:endParaRPr sz="2000"/>
           </a:p>
           <a:p>
@@ -3998,7 +4302,7 @@
               <a:buNone/>
             </a:pPr>
             <a:r>
-              <a:rPr b="1" lang="en" u="sng">
+              <a:rPr lang="en" b="1" u="sng">
                 <a:latin typeface="Calibri"/>
                 <a:ea typeface="Calibri"/>
                 <a:cs typeface="Calibri"/>
@@ -4057,9 +4361,6 @@
               </a:spcBef>
               <a:buNone/>
             </a:pPr>
-            <a:r>
-              <a:t/>
-            </a:r>
             <a:endParaRPr b="1" u="sng">
               <a:latin typeface="Calibri"/>
               <a:ea typeface="Calibri"/>
@@ -4074,9 +4375,6 @@
               </a:spcBef>
               <a:buNone/>
             </a:pPr>
-            <a:r>
-              <a:t/>
-            </a:r>
             <a:endParaRPr/>
           </a:p>
         </p:txBody>
@@ -4093,11 +4391,11 @@
 </file>
 
 <file path=ppt/slides/slide3.xml><?xml version="1.0" encoding="utf-8"?>
-<p:sld xmlns:a="http://schemas.openxmlformats.org/drawingml/2006/main" xmlns:r="http://schemas.openxmlformats.org/officeDocument/2006/relationships" xmlns:mc="http://schemas.openxmlformats.org/markup-compatibility/2006" xmlns:mv="urn:schemas-microsoft-com:mac:vml" xmlns:p="http://schemas.openxmlformats.org/presentationml/2006/main" xmlns:c="http://schemas.openxmlformats.org/drawingml/2006/chart" xmlns:dgm="http://schemas.openxmlformats.org/drawingml/2006/diagram" xmlns:o="urn:schemas-microsoft-com:office:office" xmlns:v="urn:schemas-microsoft-com:vml" xmlns:pvml="urn:schemas-microsoft-com:office:powerpoint" xmlns:com="http://schemas.openxmlformats.org/drawingml/2006/compatibility" xmlns:p14="http://schemas.microsoft.com/office/powerpoint/2010/main">
+<p:sld xmlns:a="http://schemas.openxmlformats.org/drawingml/2006/main" xmlns:r="http://schemas.openxmlformats.org/officeDocument/2006/relationships" xmlns:p="http://schemas.openxmlformats.org/presentationml/2006/main">
   <p:cSld>
     <p:spTree>
       <p:nvGrpSpPr>
-        <p:cNvPr id="41" name="Shape 41"/>
+        <p:cNvPr id="1" name="Shape 41"/>
         <p:cNvGrpSpPr/>
         <p:nvPr/>
       </p:nvGrpSpPr>
@@ -4112,7 +4410,9 @@
       <p:sp>
         <p:nvSpPr>
           <p:cNvPr id="42" name="Shape 42"/>
-          <p:cNvSpPr txBox="1"/>
+          <p:cNvSpPr txBox="1">
+            <a:spLocks noGrp="1"/>
+          </p:cNvSpPr>
           <p:nvPr>
             <p:ph type="title"/>
           </p:nvPr>
@@ -4127,7 +4427,7 @@
           </a:prstGeom>
         </p:spPr>
         <p:txBody>
-          <a:bodyPr anchorCtr="0" anchor="b" bIns="91425" lIns="91425" rIns="91425" tIns="91425">
+          <a:bodyPr lIns="91425" tIns="91425" rIns="91425" bIns="91425" anchor="b" anchorCtr="0">
             <a:noAutofit/>
           </a:bodyPr>
           <a:lstStyle/>
@@ -4153,9 +4453,11 @@
       <p:sp>
         <p:nvSpPr>
           <p:cNvPr id="43" name="Shape 43"/>
-          <p:cNvSpPr txBox="1"/>
+          <p:cNvSpPr txBox="1">
+            <a:spLocks noGrp="1"/>
+          </p:cNvSpPr>
           <p:nvPr>
-            <p:ph idx="1" type="body"/>
+            <p:ph type="body" idx="1"/>
           </p:nvPr>
         </p:nvSpPr>
         <p:spPr>
@@ -4168,7 +4470,7 @@
           </a:prstGeom>
         </p:spPr>
         <p:txBody>
-          <a:bodyPr anchorCtr="0" anchor="t" bIns="91425" lIns="91425" rIns="91425" tIns="91425">
+          <a:bodyPr lIns="91425" tIns="91425" rIns="91425" bIns="91425" anchor="t" anchorCtr="0">
             <a:noAutofit/>
           </a:bodyPr>
           <a:lstStyle/>
@@ -4254,7 +4556,7 @@
               <a:t>Users will specify a </a:t>
             </a:r>
             <a:r>
-              <a:rPr i="1" lang="en" sz="2000">
+              <a:rPr lang="en" sz="2000" i="1">
                 <a:latin typeface="Calibri"/>
                 <a:ea typeface="Calibri"/>
                 <a:cs typeface="Calibri"/>
@@ -4272,7 +4574,7 @@
               <a:t> function and a </a:t>
             </a:r>
             <a:r>
-              <a:rPr i="1" lang="en" sz="2000">
+              <a:rPr lang="en" sz="2000" i="1">
                 <a:latin typeface="Calibri"/>
                 <a:ea typeface="Calibri"/>
                 <a:cs typeface="Calibri"/>
@@ -4364,9 +4666,6 @@
               <a:buFont typeface="Arial"/>
               <a:buNone/>
             </a:pPr>
-            <a:r>
-              <a:t/>
-            </a:r>
             <a:endParaRPr sz="2400">
               <a:latin typeface="Calibri"/>
               <a:ea typeface="Calibri"/>
@@ -4381,9 +4680,6 @@
               </a:spcBef>
               <a:buNone/>
             </a:pPr>
-            <a:r>
-              <a:t/>
-            </a:r>
             <a:endParaRPr/>
           </a:p>
         </p:txBody>
@@ -4400,11 +4696,11 @@
 </file>
 
 <file path=ppt/slides/slide4.xml><?xml version="1.0" encoding="utf-8"?>
-<p:sld xmlns:a="http://schemas.openxmlformats.org/drawingml/2006/main" xmlns:r="http://schemas.openxmlformats.org/officeDocument/2006/relationships" xmlns:mc="http://schemas.openxmlformats.org/markup-compatibility/2006" xmlns:mv="urn:schemas-microsoft-com:mac:vml" xmlns:p="http://schemas.openxmlformats.org/presentationml/2006/main" xmlns:c="http://schemas.openxmlformats.org/drawingml/2006/chart" xmlns:dgm="http://schemas.openxmlformats.org/drawingml/2006/diagram" xmlns:o="urn:schemas-microsoft-com:office:office" xmlns:v="urn:schemas-microsoft-com:vml" xmlns:pvml="urn:schemas-microsoft-com:office:powerpoint" xmlns:com="http://schemas.openxmlformats.org/drawingml/2006/compatibility" xmlns:p14="http://schemas.microsoft.com/office/powerpoint/2010/main">
+<p:sld xmlns:a="http://schemas.openxmlformats.org/drawingml/2006/main" xmlns:r="http://schemas.openxmlformats.org/officeDocument/2006/relationships" xmlns:p="http://schemas.openxmlformats.org/presentationml/2006/main">
   <p:cSld>
     <p:spTree>
       <p:nvGrpSpPr>
-        <p:cNvPr id="47" name="Shape 47"/>
+        <p:cNvPr id="1" name="Shape 47"/>
         <p:cNvGrpSpPr/>
         <p:nvPr/>
       </p:nvGrpSpPr>
@@ -4419,7 +4715,9 @@
       <p:sp>
         <p:nvSpPr>
           <p:cNvPr id="48" name="Shape 48"/>
-          <p:cNvSpPr txBox="1"/>
+          <p:cNvSpPr txBox="1">
+            <a:spLocks noGrp="1"/>
+          </p:cNvSpPr>
           <p:nvPr>
             <p:ph type="title"/>
           </p:nvPr>
@@ -4434,7 +4732,7 @@
           </a:prstGeom>
         </p:spPr>
         <p:txBody>
-          <a:bodyPr anchorCtr="0" anchor="b" bIns="91425" lIns="91425" rIns="91425" tIns="91425">
+          <a:bodyPr lIns="91425" tIns="91425" rIns="91425" bIns="91425" anchor="b" anchorCtr="0">
             <a:noAutofit/>
           </a:bodyPr>
           <a:lstStyle/>
@@ -4460,9 +4758,11 @@
       <p:sp>
         <p:nvSpPr>
           <p:cNvPr id="49" name="Shape 49"/>
-          <p:cNvSpPr txBox="1"/>
+          <p:cNvSpPr txBox="1">
+            <a:spLocks noGrp="1"/>
+          </p:cNvSpPr>
           <p:nvPr>
-            <p:ph idx="1" type="body"/>
+            <p:ph type="body" idx="1"/>
           </p:nvPr>
         </p:nvSpPr>
         <p:spPr>
@@ -4475,7 +4775,7 @@
           </a:prstGeom>
         </p:spPr>
         <p:txBody>
-          <a:bodyPr anchorCtr="0" anchor="t" bIns="91425" lIns="91425" rIns="91425" tIns="91425">
+          <a:bodyPr lIns="91425" tIns="91425" rIns="91425" bIns="91425" anchor="t" anchorCtr="0">
             <a:noAutofit/>
           </a:bodyPr>
           <a:lstStyle/>
@@ -4586,9 +4886,6 @@
               </a:spcBef>
               <a:buNone/>
             </a:pPr>
-            <a:r>
-              <a:t/>
-            </a:r>
             <a:endParaRPr sz="2400">
               <a:latin typeface="Calibri"/>
               <a:ea typeface="Calibri"/>
@@ -4610,11 +4907,11 @@
 </file>
 
 <file path=ppt/slides/slide5.xml><?xml version="1.0" encoding="utf-8"?>
-<p:sld xmlns:a="http://schemas.openxmlformats.org/drawingml/2006/main" xmlns:r="http://schemas.openxmlformats.org/officeDocument/2006/relationships" xmlns:mc="http://schemas.openxmlformats.org/markup-compatibility/2006" xmlns:mv="urn:schemas-microsoft-com:mac:vml" xmlns:p="http://schemas.openxmlformats.org/presentationml/2006/main" xmlns:c="http://schemas.openxmlformats.org/drawingml/2006/chart" xmlns:dgm="http://schemas.openxmlformats.org/drawingml/2006/diagram" xmlns:o="urn:schemas-microsoft-com:office:office" xmlns:v="urn:schemas-microsoft-com:vml" xmlns:pvml="urn:schemas-microsoft-com:office:powerpoint" xmlns:com="http://schemas.openxmlformats.org/drawingml/2006/compatibility" xmlns:p14="http://schemas.microsoft.com/office/powerpoint/2010/main">
+<p:sld xmlns:a="http://schemas.openxmlformats.org/drawingml/2006/main" xmlns:r="http://schemas.openxmlformats.org/officeDocument/2006/relationships" xmlns:p="http://schemas.openxmlformats.org/presentationml/2006/main">
   <p:cSld>
     <p:spTree>
       <p:nvGrpSpPr>
-        <p:cNvPr id="53" name="Shape 53"/>
+        <p:cNvPr id="1" name="Shape 53"/>
         <p:cNvGrpSpPr/>
         <p:nvPr/>
       </p:nvGrpSpPr>
@@ -4629,7 +4926,9 @@
       <p:sp>
         <p:nvSpPr>
           <p:cNvPr id="54" name="Shape 54"/>
-          <p:cNvSpPr txBox="1"/>
+          <p:cNvSpPr txBox="1">
+            <a:spLocks noGrp="1"/>
+          </p:cNvSpPr>
           <p:nvPr>
             <p:ph type="title"/>
           </p:nvPr>
@@ -4644,7 +4943,7 @@
           </a:prstGeom>
         </p:spPr>
         <p:txBody>
-          <a:bodyPr anchorCtr="0" anchor="b" bIns="91425" lIns="91425" rIns="91425" tIns="91425">
+          <a:bodyPr lIns="91425" tIns="91425" rIns="91425" bIns="91425" anchor="b" anchorCtr="0">
             <a:noAutofit/>
           </a:bodyPr>
           <a:lstStyle/>
@@ -4670,9 +4969,11 @@
       <p:sp>
         <p:nvSpPr>
           <p:cNvPr id="55" name="Shape 55"/>
-          <p:cNvSpPr txBox="1"/>
+          <p:cNvSpPr txBox="1">
+            <a:spLocks noGrp="1"/>
+          </p:cNvSpPr>
           <p:nvPr>
-            <p:ph idx="1" type="body"/>
+            <p:ph type="body" idx="1"/>
           </p:nvPr>
         </p:nvSpPr>
         <p:spPr>
@@ -4685,7 +4986,7 @@
           </a:prstGeom>
         </p:spPr>
         <p:txBody>
-          <a:bodyPr anchorCtr="0" anchor="t" bIns="91425" lIns="91425" rIns="91425" tIns="91425">
+          <a:bodyPr lIns="91425" tIns="91425" rIns="91425" bIns="91425" anchor="t" anchorCtr="0">
             <a:noAutofit/>
           </a:bodyPr>
           <a:lstStyle/>
@@ -4875,9 +5176,6 @@
               </a:spcBef>
               <a:buNone/>
             </a:pPr>
-            <a:r>
-              <a:t/>
-            </a:r>
             <a:endParaRPr sz="2000"/>
           </a:p>
         </p:txBody>
@@ -4894,11 +5192,11 @@
 </file>
 
 <file path=ppt/slides/slide6.xml><?xml version="1.0" encoding="utf-8"?>
-<p:sld xmlns:a="http://schemas.openxmlformats.org/drawingml/2006/main" xmlns:r="http://schemas.openxmlformats.org/officeDocument/2006/relationships" xmlns:mc="http://schemas.openxmlformats.org/markup-compatibility/2006" xmlns:mv="urn:schemas-microsoft-com:mac:vml" xmlns:p="http://schemas.openxmlformats.org/presentationml/2006/main" xmlns:c="http://schemas.openxmlformats.org/drawingml/2006/chart" xmlns:dgm="http://schemas.openxmlformats.org/drawingml/2006/diagram" xmlns:o="urn:schemas-microsoft-com:office:office" xmlns:v="urn:schemas-microsoft-com:vml" xmlns:pvml="urn:schemas-microsoft-com:office:powerpoint" xmlns:com="http://schemas.openxmlformats.org/drawingml/2006/compatibility" xmlns:p14="http://schemas.microsoft.com/office/powerpoint/2010/main">
+<p:sld xmlns:a="http://schemas.openxmlformats.org/drawingml/2006/main" xmlns:r="http://schemas.openxmlformats.org/officeDocument/2006/relationships" xmlns:p="http://schemas.openxmlformats.org/presentationml/2006/main">
   <p:cSld>
     <p:spTree>
       <p:nvGrpSpPr>
-        <p:cNvPr id="59" name="Shape 59"/>
+        <p:cNvPr id="1" name="Shape 59"/>
         <p:cNvGrpSpPr/>
         <p:nvPr/>
       </p:nvGrpSpPr>
@@ -4913,7 +5211,9 @@
       <p:sp>
         <p:nvSpPr>
           <p:cNvPr id="60" name="Shape 60"/>
-          <p:cNvSpPr txBox="1"/>
+          <p:cNvSpPr txBox="1">
+            <a:spLocks noGrp="1"/>
+          </p:cNvSpPr>
           <p:nvPr>
             <p:ph type="title"/>
           </p:nvPr>
@@ -4928,7 +5228,7 @@
           </a:prstGeom>
         </p:spPr>
         <p:txBody>
-          <a:bodyPr anchorCtr="0" anchor="b" bIns="91425" lIns="91425" rIns="91425" tIns="91425">
+          <a:bodyPr lIns="91425" tIns="91425" rIns="91425" bIns="91425" anchor="b" anchorCtr="0">
             <a:noAutofit/>
           </a:bodyPr>
           <a:lstStyle/>
@@ -4954,9 +5254,11 @@
       <p:sp>
         <p:nvSpPr>
           <p:cNvPr id="61" name="Shape 61"/>
-          <p:cNvSpPr txBox="1"/>
+          <p:cNvSpPr txBox="1">
+            <a:spLocks noGrp="1"/>
+          </p:cNvSpPr>
           <p:nvPr>
-            <p:ph idx="1" type="body"/>
+            <p:ph type="body" idx="1"/>
           </p:nvPr>
         </p:nvSpPr>
         <p:spPr>
@@ -4969,12 +5271,12 @@
           </a:prstGeom>
         </p:spPr>
         <p:txBody>
-          <a:bodyPr anchorCtr="0" anchor="t" bIns="91425" lIns="91425" rIns="91425" tIns="91425">
+          <a:bodyPr lIns="91425" tIns="91425" rIns="91425" bIns="91425" anchor="t" anchorCtr="0">
             <a:noAutofit/>
           </a:bodyPr>
           <a:lstStyle/>
           <a:p>
-            <a:pPr indent="-355600" lvl="0" marL="457200">
+            <a:pPr marL="457200" lvl="0" indent="-355600">
               <a:spcBef>
                 <a:spcPts val="0"/>
               </a:spcBef>
@@ -5007,7 +5309,7 @@
           <a:blip r:embed="rId3">
             <a:alphaModFix/>
           </a:blip>
-          <a:srcRect b="0" l="0" r="7893" t="0"/>
+          <a:srcRect r="7893"/>
           <a:stretch/>
         </p:blipFill>
         <p:spPr>
@@ -5036,11 +5338,11 @@
 </file>
 
 <file path=ppt/slides/slide7.xml><?xml version="1.0" encoding="utf-8"?>
-<p:sld xmlns:a="http://schemas.openxmlformats.org/drawingml/2006/main" xmlns:r="http://schemas.openxmlformats.org/officeDocument/2006/relationships" xmlns:mc="http://schemas.openxmlformats.org/markup-compatibility/2006" xmlns:mv="urn:schemas-microsoft-com:mac:vml" xmlns:p="http://schemas.openxmlformats.org/presentationml/2006/main" xmlns:c="http://schemas.openxmlformats.org/drawingml/2006/chart" xmlns:dgm="http://schemas.openxmlformats.org/drawingml/2006/diagram" xmlns:o="urn:schemas-microsoft-com:office:office" xmlns:v="urn:schemas-microsoft-com:vml" xmlns:pvml="urn:schemas-microsoft-com:office:powerpoint" xmlns:com="http://schemas.openxmlformats.org/drawingml/2006/compatibility" xmlns:p14="http://schemas.microsoft.com/office/powerpoint/2010/main">
+<p:sld xmlns:a="http://schemas.openxmlformats.org/drawingml/2006/main" xmlns:r="http://schemas.openxmlformats.org/officeDocument/2006/relationships" xmlns:p="http://schemas.openxmlformats.org/presentationml/2006/main">
   <p:cSld>
     <p:spTree>
       <p:nvGrpSpPr>
-        <p:cNvPr id="66" name="Shape 66"/>
+        <p:cNvPr id="1" name="Shape 66"/>
         <p:cNvGrpSpPr/>
         <p:nvPr/>
       </p:nvGrpSpPr>
@@ -5055,7 +5357,9 @@
       <p:sp>
         <p:nvSpPr>
           <p:cNvPr id="67" name="Shape 67"/>
-          <p:cNvSpPr txBox="1"/>
+          <p:cNvSpPr txBox="1">
+            <a:spLocks noGrp="1"/>
+          </p:cNvSpPr>
           <p:nvPr>
             <p:ph type="title"/>
           </p:nvPr>
@@ -5070,7 +5374,7 @@
           </a:prstGeom>
         </p:spPr>
         <p:txBody>
-          <a:bodyPr anchorCtr="0" anchor="b" bIns="91425" lIns="91425" rIns="91425" tIns="91425">
+          <a:bodyPr lIns="91425" tIns="91425" rIns="91425" bIns="91425" anchor="b" anchorCtr="0">
             <a:noAutofit/>
           </a:bodyPr>
           <a:lstStyle/>
@@ -5082,7 +5386,7 @@
               <a:buNone/>
             </a:pPr>
             <a:r>
-              <a:rPr b="0" lang="en" sz="2000">
+              <a:rPr lang="en" sz="2000" b="0">
                 <a:latin typeface="Calibri"/>
                 <a:ea typeface="Calibri"/>
                 <a:cs typeface="Calibri"/>
@@ -5099,7 +5403,7 @@
               <a:buNone/>
             </a:pPr>
             <a:r>
-              <a:rPr b="0" lang="en" sz="2000">
+              <a:rPr lang="en" sz="2000" b="0">
                 <a:latin typeface="Calibri"/>
                 <a:ea typeface="Calibri"/>
                 <a:cs typeface="Calibri"/>
@@ -5113,9 +5417,11 @@
       <p:sp>
         <p:nvSpPr>
           <p:cNvPr id="68" name="Shape 68"/>
-          <p:cNvSpPr txBox="1"/>
+          <p:cNvSpPr txBox="1">
+            <a:spLocks noGrp="1"/>
+          </p:cNvSpPr>
           <p:nvPr>
-            <p:ph idx="1" type="body"/>
+            <p:ph type="body" idx="1"/>
           </p:nvPr>
         </p:nvSpPr>
         <p:spPr>
@@ -5128,7 +5434,7 @@
           </a:prstGeom>
         </p:spPr>
         <p:txBody>
-          <a:bodyPr anchorCtr="0" anchor="t" bIns="91425" lIns="91425" rIns="91425" tIns="91425">
+          <a:bodyPr lIns="91425" tIns="91425" rIns="91425" bIns="91425" anchor="t" anchorCtr="0">
             <a:noAutofit/>
           </a:bodyPr>
           <a:lstStyle/>
@@ -5139,9 +5445,6 @@
               </a:spcBef>
               <a:buNone/>
             </a:pPr>
-            <a:r>
-              <a:t/>
-            </a:r>
             <a:endParaRPr/>
           </a:p>
         </p:txBody>
@@ -5186,11 +5489,11 @@
 </file>
 
 <file path=ppt/slides/slide8.xml><?xml version="1.0" encoding="utf-8"?>
-<p:sld xmlns:a="http://schemas.openxmlformats.org/drawingml/2006/main" xmlns:r="http://schemas.openxmlformats.org/officeDocument/2006/relationships" xmlns:mc="http://schemas.openxmlformats.org/markup-compatibility/2006" xmlns:mv="urn:schemas-microsoft-com:mac:vml" xmlns:p="http://schemas.openxmlformats.org/presentationml/2006/main" xmlns:c="http://schemas.openxmlformats.org/drawingml/2006/chart" xmlns:dgm="http://schemas.openxmlformats.org/drawingml/2006/diagram" xmlns:o="urn:schemas-microsoft-com:office:office" xmlns:v="urn:schemas-microsoft-com:vml" xmlns:pvml="urn:schemas-microsoft-com:office:powerpoint" xmlns:com="http://schemas.openxmlformats.org/drawingml/2006/compatibility" xmlns:p14="http://schemas.microsoft.com/office/powerpoint/2010/main">
+<p:sld xmlns:a="http://schemas.openxmlformats.org/drawingml/2006/main" xmlns:r="http://schemas.openxmlformats.org/officeDocument/2006/relationships" xmlns:p="http://schemas.openxmlformats.org/presentationml/2006/main">
   <p:cSld>
     <p:spTree>
       <p:nvGrpSpPr>
-        <p:cNvPr id="73" name="Shape 73"/>
+        <p:cNvPr id="1" name="Shape 73"/>
         <p:cNvGrpSpPr/>
         <p:nvPr/>
       </p:nvGrpSpPr>
@@ -5205,7 +5508,9 @@
       <p:sp>
         <p:nvSpPr>
           <p:cNvPr id="74" name="Shape 74"/>
-          <p:cNvSpPr txBox="1"/>
+          <p:cNvSpPr txBox="1">
+            <a:spLocks noGrp="1"/>
+          </p:cNvSpPr>
           <p:nvPr>
             <p:ph type="title"/>
           </p:nvPr>
@@ -5220,12 +5525,12 @@
           </a:prstGeom>
         </p:spPr>
         <p:txBody>
-          <a:bodyPr anchorCtr="0" anchor="b" bIns="91425" lIns="91425" rIns="91425" tIns="91425">
+          <a:bodyPr lIns="91425" tIns="91425" rIns="91425" bIns="91425" anchor="b" anchorCtr="0">
             <a:noAutofit/>
           </a:bodyPr>
           <a:lstStyle/>
           <a:p>
-            <a:pPr indent="0" marL="0" marR="0" rtl="0" algn="l">
+            <a:pPr marL="0" marR="0" indent="0" algn="l" rtl="0">
               <a:lnSpc>
                 <a:spcPct val="100000"/>
               </a:lnSpc>
@@ -5238,7 +5543,7 @@
               <a:buNone/>
             </a:pPr>
             <a:r>
-              <a:rPr b="0" lang="en" sz="2000">
+              <a:rPr lang="en" sz="2000" b="0">
                 <a:latin typeface="Calibri"/>
                 <a:ea typeface="Calibri"/>
                 <a:cs typeface="Calibri"/>
@@ -5248,7 +5553,7 @@
             </a:r>
           </a:p>
           <a:p>
-            <a:pPr indent="0" marL="0" marR="0" rtl="0" algn="l">
+            <a:pPr marL="0" marR="0" indent="0" algn="l" rtl="0">
               <a:lnSpc>
                 <a:spcPct val="100000"/>
               </a:lnSpc>
@@ -5261,7 +5566,7 @@
               <a:buNone/>
             </a:pPr>
             <a:r>
-              <a:rPr b="0" lang="en" sz="2000">
+              <a:rPr lang="en" sz="2000" b="0">
                 <a:latin typeface="Calibri"/>
                 <a:ea typeface="Calibri"/>
                 <a:cs typeface="Calibri"/>
@@ -5275,9 +5580,11 @@
       <p:sp>
         <p:nvSpPr>
           <p:cNvPr id="75" name="Shape 75"/>
-          <p:cNvSpPr txBox="1"/>
+          <p:cNvSpPr txBox="1">
+            <a:spLocks noGrp="1"/>
+          </p:cNvSpPr>
           <p:nvPr>
-            <p:ph idx="1" type="body"/>
+            <p:ph type="body" idx="1"/>
           </p:nvPr>
         </p:nvSpPr>
         <p:spPr>
@@ -5290,7 +5597,7 @@
           </a:prstGeom>
         </p:spPr>
         <p:txBody>
-          <a:bodyPr anchorCtr="0" anchor="t" bIns="91425" lIns="91425" rIns="91425" tIns="91425">
+          <a:bodyPr lIns="91425" tIns="91425" rIns="91425" bIns="91425" anchor="t" anchorCtr="0">
             <a:noAutofit/>
           </a:bodyPr>
           <a:lstStyle/>
@@ -5301,9 +5608,6 @@
               </a:spcBef>
               <a:buNone/>
             </a:pPr>
-            <a:r>
-              <a:t/>
-            </a:r>
             <a:endParaRPr/>
           </a:p>
         </p:txBody>
@@ -5348,11 +5652,11 @@
 </file>
 
 <file path=ppt/slides/slide9.xml><?xml version="1.0" encoding="utf-8"?>
-<p:sld xmlns:a="http://schemas.openxmlformats.org/drawingml/2006/main" xmlns:r="http://schemas.openxmlformats.org/officeDocument/2006/relationships" xmlns:mc="http://schemas.openxmlformats.org/markup-compatibility/2006" xmlns:mv="urn:schemas-microsoft-com:mac:vml" xmlns:p="http://schemas.openxmlformats.org/presentationml/2006/main" xmlns:c="http://schemas.openxmlformats.org/drawingml/2006/chart" xmlns:dgm="http://schemas.openxmlformats.org/drawingml/2006/diagram" xmlns:o="urn:schemas-microsoft-com:office:office" xmlns:v="urn:schemas-microsoft-com:vml" xmlns:pvml="urn:schemas-microsoft-com:office:powerpoint" xmlns:com="http://schemas.openxmlformats.org/drawingml/2006/compatibility" xmlns:p14="http://schemas.microsoft.com/office/powerpoint/2010/main">
+<p:sld xmlns:a="http://schemas.openxmlformats.org/drawingml/2006/main" xmlns:r="http://schemas.openxmlformats.org/officeDocument/2006/relationships" xmlns:p="http://schemas.openxmlformats.org/presentationml/2006/main">
   <p:cSld>
     <p:spTree>
       <p:nvGrpSpPr>
-        <p:cNvPr id="80" name="Shape 80"/>
+        <p:cNvPr id="1" name="Shape 80"/>
         <p:cNvGrpSpPr/>
         <p:nvPr/>
       </p:nvGrpSpPr>
@@ -5367,7 +5671,9 @@
       <p:sp>
         <p:nvSpPr>
           <p:cNvPr id="81" name="Shape 81"/>
-          <p:cNvSpPr txBox="1"/>
+          <p:cNvSpPr txBox="1">
+            <a:spLocks noGrp="1"/>
+          </p:cNvSpPr>
           <p:nvPr>
             <p:ph type="title"/>
           </p:nvPr>
@@ -5382,7 +5688,7 @@
           </a:prstGeom>
         </p:spPr>
         <p:txBody>
-          <a:bodyPr anchorCtr="0" anchor="b" bIns="91425" lIns="91425" rIns="91425" tIns="91425">
+          <a:bodyPr lIns="91425" tIns="91425" rIns="91425" bIns="91425" anchor="b" anchorCtr="0">
             <a:noAutofit/>
           </a:bodyPr>
           <a:lstStyle/>
@@ -5394,7 +5700,7 @@
               <a:buNone/>
             </a:pPr>
             <a:r>
-              <a:rPr b="0" lang="en" sz="2000">
+              <a:rPr lang="en" sz="2000" b="0">
                 <a:latin typeface="Calibri"/>
                 <a:ea typeface="Calibri"/>
                 <a:cs typeface="Calibri"/>
@@ -5410,19 +5716,18 @@
               </a:spcBef>
               <a:buNone/>
             </a:pPr>
-            <a:r>
-              <a:t/>
-            </a:r>
-            <a:endParaRPr b="0" sz="2000"/>
+            <a:endParaRPr sz="2000" b="0"/>
           </a:p>
         </p:txBody>
       </p:sp>
       <p:sp>
         <p:nvSpPr>
           <p:cNvPr id="82" name="Shape 82"/>
-          <p:cNvSpPr txBox="1"/>
+          <p:cNvSpPr txBox="1">
+            <a:spLocks noGrp="1"/>
+          </p:cNvSpPr>
           <p:nvPr>
-            <p:ph idx="1" type="body"/>
+            <p:ph type="body" idx="1"/>
           </p:nvPr>
         </p:nvSpPr>
         <p:spPr>
@@ -5435,7 +5740,7 @@
           </a:prstGeom>
         </p:spPr>
         <p:txBody>
-          <a:bodyPr anchorCtr="0" anchor="t" bIns="91425" lIns="91425" rIns="91425" tIns="91425">
+          <a:bodyPr lIns="91425" tIns="91425" rIns="91425" bIns="91425" anchor="t" anchorCtr="0">
             <a:noAutofit/>
           </a:bodyPr>
           <a:lstStyle/>
@@ -5446,9 +5751,6 @@
               </a:spcBef>
               <a:buNone/>
             </a:pPr>
-            <a:r>
-              <a:t/>
-            </a:r>
             <a:endParaRPr/>
           </a:p>
         </p:txBody>
@@ -5493,44 +5795,44 @@
 </file>
 
 <file path=ppt/theme/theme1.xml><?xml version="1.0" encoding="utf-8"?>
-<a:theme xmlns:a="http://schemas.openxmlformats.org/drawingml/2006/main" xmlns:r="http://schemas.openxmlformats.org/officeDocument/2006/relationships" name="Office Theme">
+<a:theme xmlns:a="http://schemas.openxmlformats.org/drawingml/2006/main" name="simple-light">
   <a:themeElements>
-    <a:clrScheme name="Office">
+    <a:clrScheme name="Custom 347">
       <a:dk1>
-        <a:sysClr lastClr="000000" val="windowText"/>
+        <a:srgbClr val="000000"/>
       </a:dk1>
       <a:lt1>
-        <a:sysClr lastClr="FFFFFF" val="window"/>
+        <a:srgbClr val="FFFFFF"/>
       </a:lt1>
       <a:dk2>
-        <a:srgbClr val="1F497D"/>
+        <a:srgbClr val="666666"/>
       </a:dk2>
       <a:lt2>
-        <a:srgbClr val="EEECE1"/>
+        <a:srgbClr val="CCCCCC"/>
       </a:lt2>
       <a:accent1>
-        <a:srgbClr val="4F81BD"/>
+        <a:srgbClr val="3A81BA"/>
       </a:accent1>
       <a:accent2>
-        <a:srgbClr val="C0504D"/>
+        <a:srgbClr val="D89F39"/>
       </a:accent2>
       <a:accent3>
-        <a:srgbClr val="9BBB59"/>
+        <a:srgbClr val="8BAB42"/>
       </a:accent3>
       <a:accent4>
-        <a:srgbClr val="8064A2"/>
+        <a:srgbClr val="57A7B5"/>
       </a:accent4>
       <a:accent5>
-        <a:srgbClr val="4BACC6"/>
+        <a:srgbClr val="8B81D2"/>
       </a:accent5>
       <a:accent6>
-        <a:srgbClr val="F79646"/>
+        <a:srgbClr val="963334"/>
       </a:accent6>
       <a:hlink>
-        <a:srgbClr val="0000FF"/>
+        <a:srgbClr val="1155CC"/>
       </a:hlink>
       <a:folHlink>
-        <a:srgbClr val="800080"/>
+        <a:srgbClr val="6611CC"/>
       </a:folHlink>
     </a:clrScheme>
     <a:fontScheme name="Office">
@@ -5652,7 +5954,7 @@
         </a:gradFill>
       </a:fillStyleLst>
       <a:lnStyleLst>
-        <a:ln cap="flat" cmpd="sng" w="9525" algn="ctr">
+        <a:ln w="9525" cap="flat" cmpd="sng" algn="ctr">
           <a:solidFill>
             <a:schemeClr val="phClr">
               <a:shade val="95000"/>
@@ -5661,13 +5963,13 @@
           </a:solidFill>
           <a:prstDash val="solid"/>
         </a:ln>
-        <a:ln cap="flat" cmpd="sng" w="25400" algn="ctr">
+        <a:ln w="25400" cap="flat" cmpd="sng" algn="ctr">
           <a:solidFill>
             <a:schemeClr val="phClr"/>
           </a:solidFill>
           <a:prstDash val="solid"/>
         </a:ln>
-        <a:ln cap="flat" cmpd="sng" w="38100" algn="ctr">
+        <a:ln w="38100" cap="flat" cmpd="sng" algn="ctr">
           <a:solidFill>
             <a:schemeClr val="phClr"/>
           </a:solidFill>
@@ -5677,7 +5979,7 @@
       <a:effectStyleLst>
         <a:effectStyle>
           <a:effectLst>
-            <a:outerShdw blurRad="40000" rotWithShape="0" dir="5400000" dist="20000">
+            <a:outerShdw blurRad="40000" dist="20000" dir="5400000" rotWithShape="0">
               <a:srgbClr val="000000">
                 <a:alpha val="38000"/>
               </a:srgbClr>
@@ -5686,7 +5988,7 @@
         </a:effectStyle>
         <a:effectStyle>
           <a:effectLst>
-            <a:outerShdw blurRad="40000" rotWithShape="0" dir="5400000" dist="23000">
+            <a:outerShdw blurRad="40000" dist="23000" dir="5400000" rotWithShape="0">
               <a:srgbClr val="000000">
                 <a:alpha val="35000"/>
               </a:srgbClr>
@@ -5695,7 +5997,7 @@
         </a:effectStyle>
         <a:effectStyle>
           <a:effectLst>
-            <a:outerShdw blurRad="40000" rotWithShape="0" dir="5400000" dist="23000">
+            <a:outerShdw blurRad="40000" dist="23000" dir="5400000" rotWithShape="0">
               <a:srgbClr val="000000">
                 <a:alpha val="35000"/>
               </a:srgbClr>
@@ -5705,12 +6007,12 @@
             <a:camera prst="orthographicFront">
               <a:rot lat="0" lon="0" rev="0"/>
             </a:camera>
-            <a:lightRig dir="t" rig="threePt">
+            <a:lightRig rig="threePt" dir="t">
               <a:rot lat="0" lon="0" rev="1200000"/>
             </a:lightRig>
           </a:scene3d>
           <a:sp3d>
-            <a:bevelT h="25400" w="63500"/>
+            <a:bevelT w="63500" h="25400"/>
           </a:sp3d>
         </a:effectStyle>
       </a:effectStyleLst>
@@ -5741,7 +6043,7 @@
             </a:gs>
           </a:gsLst>
           <a:path path="circle">
-            <a:fillToRect b="180000" l="50000" r="50000" t="-80000"/>
+            <a:fillToRect l="50000" t="-80000" r="50000" b="180000"/>
           </a:path>
         </a:gradFill>
         <a:gradFill rotWithShape="1">
@@ -5760,57 +6062,19 @@
             </a:gs>
           </a:gsLst>
           <a:path path="circle">
-            <a:fillToRect b="50000" l="50000" r="50000" t="50000"/>
+            <a:fillToRect l="50000" t="50000" r="50000" b="50000"/>
           </a:path>
         </a:gradFill>
       </a:bgFillStyleLst>
     </a:fmtScheme>
   </a:themeElements>
-  <a:objectDefaults>
-    <a:spDef>
-      <a:spPr/>
-      <a:bodyPr/>
-      <a:lstStyle/>
-      <a:style>
-        <a:lnRef idx="1">
-          <a:schemeClr val="accent1"/>
-        </a:lnRef>
-        <a:fillRef idx="3">
-          <a:schemeClr val="accent1"/>
-        </a:fillRef>
-        <a:effectRef idx="2">
-          <a:schemeClr val="accent1"/>
-        </a:effectRef>
-        <a:fontRef idx="minor">
-          <a:schemeClr val="lt1"/>
-        </a:fontRef>
-      </a:style>
-    </a:spDef>
-    <a:lnDef>
-      <a:spPr/>
-      <a:bodyPr/>
-      <a:lstStyle/>
-      <a:style>
-        <a:lnRef idx="2">
-          <a:schemeClr val="accent1"/>
-        </a:lnRef>
-        <a:fillRef idx="0">
-          <a:schemeClr val="accent1"/>
-        </a:fillRef>
-        <a:effectRef idx="1">
-          <a:schemeClr val="accent1"/>
-        </a:effectRef>
-        <a:fontRef idx="minor">
-          <a:schemeClr val="tx1"/>
-        </a:fontRef>
-      </a:style>
-    </a:lnDef>
-  </a:objectDefaults>
+  <a:objectDefaults/>
+  <a:extraClrSchemeLst/>
 </a:theme>
 </file>
 
 <file path=ppt/theme/theme2.xml><?xml version="1.0" encoding="utf-8"?>
-<a:theme xmlns:a="http://schemas.openxmlformats.org/drawingml/2006/main" xmlns:r="http://schemas.openxmlformats.org/officeDocument/2006/relationships" name="Custom Theme">
+<a:theme xmlns:a="http://schemas.openxmlformats.org/drawingml/2006/main" name="Custom Theme">
   <a:themeElements>
     <a:clrScheme name="Default">
       <a:dk1>
@@ -5969,7 +6233,7 @@
         </a:gradFill>
       </a:fillStyleLst>
       <a:lnStyleLst>
-        <a:ln cap="flat" cmpd="sng" w="9525" algn="ctr">
+        <a:ln w="9525" cap="flat" cmpd="sng" algn="ctr">
           <a:solidFill>
             <a:schemeClr val="phClr">
               <a:shade val="95000"/>
@@ -5978,13 +6242,13 @@
           </a:solidFill>
           <a:prstDash val="solid"/>
         </a:ln>
-        <a:ln cap="flat" cmpd="sng" w="25400" algn="ctr">
+        <a:ln w="25400" cap="flat" cmpd="sng" algn="ctr">
           <a:solidFill>
             <a:schemeClr val="phClr"/>
           </a:solidFill>
           <a:prstDash val="solid"/>
         </a:ln>
-        <a:ln cap="flat" cmpd="sng" w="38100" algn="ctr">
+        <a:ln w="38100" cap="flat" cmpd="sng" algn="ctr">
           <a:solidFill>
             <a:schemeClr val="phClr"/>
           </a:solidFill>
@@ -5994,7 +6258,7 @@
       <a:effectStyleLst>
         <a:effectStyle>
           <a:effectLst>
-            <a:outerShdw blurRad="40000" rotWithShape="0" dir="5400000" dist="20000">
+            <a:outerShdw blurRad="40000" dist="20000" dir="5400000" rotWithShape="0">
               <a:srgbClr val="000000">
                 <a:alpha val="38000"/>
               </a:srgbClr>
@@ -6003,7 +6267,7 @@
         </a:effectStyle>
         <a:effectStyle>
           <a:effectLst>
-            <a:outerShdw blurRad="40000" rotWithShape="0" dir="5400000" dist="23000">
+            <a:outerShdw blurRad="40000" dist="23000" dir="5400000" rotWithShape="0">
               <a:srgbClr val="000000">
                 <a:alpha val="35000"/>
               </a:srgbClr>
@@ -6012,7 +6276,7 @@
         </a:effectStyle>
         <a:effectStyle>
           <a:effectLst>
-            <a:outerShdw blurRad="40000" rotWithShape="0" dir="5400000" dist="23000">
+            <a:outerShdw blurRad="40000" dist="23000" dir="5400000" rotWithShape="0">
               <a:srgbClr val="000000">
                 <a:alpha val="35000"/>
               </a:srgbClr>
@@ -6022,12 +6286,12 @@
             <a:camera prst="orthographicFront">
               <a:rot lat="0" lon="0" rev="0"/>
             </a:camera>
-            <a:lightRig dir="t" rig="threePt">
+            <a:lightRig rig="threePt" dir="t">
               <a:rot lat="0" lon="0" rev="1200000"/>
             </a:lightRig>
           </a:scene3d>
           <a:sp3d>
-            <a:bevelT h="25400" w="63500"/>
+            <a:bevelT w="63500" h="25400"/>
           </a:sp3d>
         </a:effectStyle>
       </a:effectStyleLst>
@@ -6058,7 +6322,7 @@
             </a:gs>
           </a:gsLst>
           <a:path path="circle">
-            <a:fillToRect b="180000" l="50000" r="50000" t="-80000"/>
+            <a:fillToRect l="50000" t="-80000" r="50000" b="180000"/>
           </a:path>
         </a:gradFill>
         <a:gradFill rotWithShape="1">
@@ -6077,288 +6341,13 @@
             </a:gs>
           </a:gsLst>
           <a:path path="circle">
-            <a:fillToRect b="50000" l="50000" r="50000" t="50000"/>
+            <a:fillToRect l="50000" t="50000" r="50000" b="50000"/>
           </a:path>
         </a:gradFill>
       </a:bgFillStyleLst>
     </a:fmtScheme>
   </a:themeElements>
-</a:theme>
-</file>
-
-<file path=ppt/theme/theme3.xml><?xml version="1.0" encoding="utf-8"?>
-<a:theme xmlns:a="http://schemas.openxmlformats.org/drawingml/2006/main" xmlns:r="http://schemas.openxmlformats.org/officeDocument/2006/relationships" name="simple-light">
-  <a:themeElements>
-    <a:clrScheme name="Custom 347">
-      <a:dk1>
-        <a:srgbClr val="000000"/>
-      </a:dk1>
-      <a:lt1>
-        <a:srgbClr val="FFFFFF"/>
-      </a:lt1>
-      <a:dk2>
-        <a:srgbClr val="666666"/>
-      </a:dk2>
-      <a:lt2>
-        <a:srgbClr val="CCCCCC"/>
-      </a:lt2>
-      <a:accent1>
-        <a:srgbClr val="3A81BA"/>
-      </a:accent1>
-      <a:accent2>
-        <a:srgbClr val="D89F39"/>
-      </a:accent2>
-      <a:accent3>
-        <a:srgbClr val="8BAB42"/>
-      </a:accent3>
-      <a:accent4>
-        <a:srgbClr val="57A7B5"/>
-      </a:accent4>
-      <a:accent5>
-        <a:srgbClr val="8B81D2"/>
-      </a:accent5>
-      <a:accent6>
-        <a:srgbClr val="963334"/>
-      </a:accent6>
-      <a:hlink>
-        <a:srgbClr val="1155CC"/>
-      </a:hlink>
-      <a:folHlink>
-        <a:srgbClr val="6611CC"/>
-      </a:folHlink>
-    </a:clrScheme>
-    <a:fontScheme name="Office">
-      <a:majorFont>
-        <a:latin typeface="Arial"/>
-        <a:ea typeface=""/>
-        <a:cs typeface=""/>
-        <a:font script="Jpan" typeface="ＭＳ Ｐゴシック"/>
-        <a:font script="Hang" typeface="맑은 고딕"/>
-        <a:font script="Hans" typeface="宋体"/>
-        <a:font script="Hant" typeface="新細明體"/>
-        <a:font script="Arab" typeface="Times New Roman"/>
-        <a:font script="Hebr" typeface="Times New Roman"/>
-        <a:font script="Thai" typeface="Angsana New"/>
-        <a:font script="Ethi" typeface="Nyala"/>
-        <a:font script="Beng" typeface="Vrinda"/>
-        <a:font script="Gujr" typeface="Shruti"/>
-        <a:font script="Khmr" typeface="MoolBoran"/>
-        <a:font script="Knda" typeface="Tunga"/>
-        <a:font script="Guru" typeface="Raavi"/>
-        <a:font script="Cans" typeface="Euphemia"/>
-        <a:font script="Cher" typeface="Plantagenet Cherokee"/>
-        <a:font script="Yiii" typeface="Microsoft Yi Baiti"/>
-        <a:font script="Tibt" typeface="Microsoft Himalaya"/>
-        <a:font script="Thaa" typeface="MV Boli"/>
-        <a:font script="Deva" typeface="Mangal"/>
-        <a:font script="Telu" typeface="Gautami"/>
-        <a:font script="Taml" typeface="Latha"/>
-        <a:font script="Syrc" typeface="Estrangelo Edessa"/>
-        <a:font script="Orya" typeface="Kalinga"/>
-        <a:font script="Mlym" typeface="Kartika"/>
-        <a:font script="Laoo" typeface="DokChampa"/>
-        <a:font script="Sinh" typeface="Iskoola Pota"/>
-        <a:font script="Mong" typeface="Mongolian Baiti"/>
-        <a:font script="Viet" typeface="Times New Roman"/>
-        <a:font script="Uigh" typeface="Microsoft Uighur"/>
-      </a:majorFont>
-      <a:minorFont>
-        <a:latin typeface="Arial"/>
-        <a:ea typeface=""/>
-        <a:cs typeface=""/>
-        <a:font script="Jpan" typeface="ＭＳ Ｐゴシック"/>
-        <a:font script="Hang" typeface="맑은 고딕"/>
-        <a:font script="Hans" typeface="宋体"/>
-        <a:font script="Hant" typeface="新細明體"/>
-        <a:font script="Arab" typeface="Times New Roman"/>
-        <a:font script="Hebr" typeface="Times New Roman"/>
-        <a:font script="Thai" typeface="Angsana New"/>
-        <a:font script="Ethi" typeface="Nyala"/>
-        <a:font script="Beng" typeface="Vrinda"/>
-        <a:font script="Gujr" typeface="Shruti"/>
-        <a:font script="Khmr" typeface="MoolBoran"/>
-        <a:font script="Knda" typeface="Tunga"/>
-        <a:font script="Guru" typeface="Raavi"/>
-        <a:font script="Cans" typeface="Euphemia"/>
-        <a:font script="Cher" typeface="Plantagenet Cherokee"/>
-        <a:font script="Yiii" typeface="Microsoft Yi Baiti"/>
-        <a:font script="Tibt" typeface="Microsoft Himalaya"/>
-        <a:font script="Thaa" typeface="MV Boli"/>
-        <a:font script="Deva" typeface="Mangal"/>
-        <a:font script="Telu" typeface="Gautami"/>
-        <a:font script="Taml" typeface="Latha"/>
-        <a:font script="Syrc" typeface="Estrangelo Edessa"/>
-        <a:font script="Orya" typeface="Kalinga"/>
-        <a:font script="Mlym" typeface="Kartika"/>
-        <a:font script="Laoo" typeface="DokChampa"/>
-        <a:font script="Sinh" typeface="Iskoola Pota"/>
-        <a:font script="Mong" typeface="Mongolian Baiti"/>
-        <a:font script="Viet" typeface="Times New Roman"/>
-        <a:font script="Uigh" typeface="Microsoft Uighur"/>
-      </a:minorFont>
-    </a:fontScheme>
-    <a:fmtScheme name="Office">
-      <a:fillStyleLst>
-        <a:solidFill>
-          <a:schemeClr val="phClr"/>
-        </a:solidFill>
-        <a:gradFill rotWithShape="1">
-          <a:gsLst>
-            <a:gs pos="0">
-              <a:schemeClr val="phClr">
-                <a:tint val="50000"/>
-                <a:satMod val="300000"/>
-              </a:schemeClr>
-            </a:gs>
-            <a:gs pos="35000">
-              <a:schemeClr val="phClr">
-                <a:tint val="37000"/>
-                <a:satMod val="300000"/>
-              </a:schemeClr>
-            </a:gs>
-            <a:gs pos="100000">
-              <a:schemeClr val="phClr">
-                <a:tint val="15000"/>
-                <a:satMod val="350000"/>
-              </a:schemeClr>
-            </a:gs>
-          </a:gsLst>
-          <a:lin ang="16200000" scaled="1"/>
-        </a:gradFill>
-        <a:gradFill rotWithShape="1">
-          <a:gsLst>
-            <a:gs pos="0">
-              <a:schemeClr val="phClr">
-                <a:tint val="100000"/>
-                <a:shade val="100000"/>
-                <a:satMod val="130000"/>
-              </a:schemeClr>
-            </a:gs>
-            <a:gs pos="100000">
-              <a:schemeClr val="phClr">
-                <a:tint val="50000"/>
-                <a:shade val="100000"/>
-                <a:satMod val="350000"/>
-              </a:schemeClr>
-            </a:gs>
-          </a:gsLst>
-          <a:lin ang="16200000" scaled="0"/>
-        </a:gradFill>
-      </a:fillStyleLst>
-      <a:lnStyleLst>
-        <a:ln cap="flat" cmpd="sng" w="9525" algn="ctr">
-          <a:solidFill>
-            <a:schemeClr val="phClr">
-              <a:shade val="95000"/>
-              <a:satMod val="105000"/>
-            </a:schemeClr>
-          </a:solidFill>
-          <a:prstDash val="solid"/>
-        </a:ln>
-        <a:ln cap="flat" cmpd="sng" w="25400" algn="ctr">
-          <a:solidFill>
-            <a:schemeClr val="phClr"/>
-          </a:solidFill>
-          <a:prstDash val="solid"/>
-        </a:ln>
-        <a:ln cap="flat" cmpd="sng" w="38100" algn="ctr">
-          <a:solidFill>
-            <a:schemeClr val="phClr"/>
-          </a:solidFill>
-          <a:prstDash val="solid"/>
-        </a:ln>
-      </a:lnStyleLst>
-      <a:effectStyleLst>
-        <a:effectStyle>
-          <a:effectLst>
-            <a:outerShdw blurRad="40000" rotWithShape="0" dir="5400000" dist="20000">
-              <a:srgbClr val="000000">
-                <a:alpha val="38000"/>
-              </a:srgbClr>
-            </a:outerShdw>
-          </a:effectLst>
-        </a:effectStyle>
-        <a:effectStyle>
-          <a:effectLst>
-            <a:outerShdw blurRad="40000" rotWithShape="0" dir="5400000" dist="23000">
-              <a:srgbClr val="000000">
-                <a:alpha val="35000"/>
-              </a:srgbClr>
-            </a:outerShdw>
-          </a:effectLst>
-        </a:effectStyle>
-        <a:effectStyle>
-          <a:effectLst>
-            <a:outerShdw blurRad="40000" rotWithShape="0" dir="5400000" dist="23000">
-              <a:srgbClr val="000000">
-                <a:alpha val="35000"/>
-              </a:srgbClr>
-            </a:outerShdw>
-          </a:effectLst>
-          <a:scene3d>
-            <a:camera prst="orthographicFront">
-              <a:rot lat="0" lon="0" rev="0"/>
-            </a:camera>
-            <a:lightRig dir="t" rig="threePt">
-              <a:rot lat="0" lon="0" rev="1200000"/>
-            </a:lightRig>
-          </a:scene3d>
-          <a:sp3d>
-            <a:bevelT h="25400" w="63500"/>
-          </a:sp3d>
-        </a:effectStyle>
-      </a:effectStyleLst>
-      <a:bgFillStyleLst>
-        <a:solidFill>
-          <a:schemeClr val="phClr"/>
-        </a:solidFill>
-        <a:gradFill rotWithShape="1">
-          <a:gsLst>
-            <a:gs pos="0">
-              <a:schemeClr val="phClr">
-                <a:tint val="40000"/>
-                <a:satMod val="350000"/>
-              </a:schemeClr>
-            </a:gs>
-            <a:gs pos="40000">
-              <a:schemeClr val="phClr">
-                <a:tint val="45000"/>
-                <a:shade val="99000"/>
-                <a:satMod val="350000"/>
-              </a:schemeClr>
-            </a:gs>
-            <a:gs pos="100000">
-              <a:schemeClr val="phClr">
-                <a:shade val="20000"/>
-                <a:satMod val="255000"/>
-              </a:schemeClr>
-            </a:gs>
-          </a:gsLst>
-          <a:path path="circle">
-            <a:fillToRect b="180000" l="50000" r="50000" t="-80000"/>
-          </a:path>
-        </a:gradFill>
-        <a:gradFill rotWithShape="1">
-          <a:gsLst>
-            <a:gs pos="0">
-              <a:schemeClr val="phClr">
-                <a:tint val="80000"/>
-                <a:satMod val="300000"/>
-              </a:schemeClr>
-            </a:gs>
-            <a:gs pos="100000">
-              <a:schemeClr val="phClr">
-                <a:shade val="30000"/>
-                <a:satMod val="200000"/>
-              </a:schemeClr>
-            </a:gs>
-          </a:gsLst>
-          <a:path path="circle">
-            <a:fillToRect b="50000" l="50000" r="50000" t="50000"/>
-          </a:path>
-        </a:gradFill>
-      </a:bgFillStyleLst>
-    </a:fmtScheme>
-  </a:themeElements>
+  <a:objectDefaults/>
+  <a:extraClrSchemeLst/>
 </a:theme>
 </file>
</xml_diff>